<commit_message>
Avance final - Carlos (No se logro terminar :''c)
</commit_message>
<xml_diff>
--- a/Documentacion/PROYECTO LP2 –  2021 .pptx
+++ b/Documentacion/PROYECTO LP2 –  2021 .pptx
@@ -311,7 +311,7 @@
           </a:lstStyle>
           <a:p>
             <a:r>
-              <a:rPr lang="es-ES" smtClean="0"/>
+              <a:rPr lang="es-ES"/>
               <a:t>Haga clic para modificar el estilo de título del patrón</a:t>
             </a:r>
             <a:endParaRPr lang="en-US" dirty="0"/>
@@ -378,7 +378,7 @@
           </a:lstStyle>
           <a:p>
             <a:r>
-              <a:rPr lang="es-ES" smtClean="0"/>
+              <a:rPr lang="es-ES"/>
               <a:t>Haga clic para modificar el estilo de subtítulo del patrón</a:t>
             </a:r>
             <a:endParaRPr lang="en-US" dirty="0"/>
@@ -402,7 +402,7 @@
           <a:p>
             <a:fld id="{78ABE3C1-DBE1-495D-B57B-2849774B866A}" type="datetimeFigureOut">
               <a:rPr lang="en-US" dirty="0"/>
-              <a:t>6/21/2021</a:t>
+              <a:t>6/23/2021</a:t>
             </a:fld>
             <a:endParaRPr lang="en-US" dirty="0"/>
           </a:p>
@@ -646,7 +646,7 @@
           </a:lstStyle>
           <a:p>
             <a:r>
-              <a:rPr lang="es-ES" smtClean="0"/>
+              <a:rPr lang="es-ES"/>
               <a:t>Haga clic para modificar el estilo de título del patrón</a:t>
             </a:r>
             <a:endParaRPr lang="en-US" dirty="0"/>
@@ -722,7 +722,7 @@
           </a:lstStyle>
           <a:p>
             <a:r>
-              <a:rPr lang="es-ES" smtClean="0"/>
+              <a:rPr lang="es-ES"/>
               <a:t>Haga clic en el icono para agregar una imagen</a:t>
             </a:r>
             <a:endParaRPr lang="en-US" dirty="0"/>
@@ -788,7 +788,7 @@
           <a:p>
             <a:pPr lvl="0"/>
             <a:r>
-              <a:rPr lang="es-ES" smtClean="0"/>
+              <a:rPr lang="es-ES"/>
               <a:t>Haga clic para modificar el estilo de texto del patrón</a:t>
             </a:r>
           </a:p>
@@ -811,7 +811,7 @@
           <a:p>
             <a:fld id="{446C117F-5CCF-4837-BE5F-2B92066CAFAF}" type="datetimeFigureOut">
               <a:rPr lang="en-US" dirty="0"/>
-              <a:t>6/21/2021</a:t>
+              <a:t>6/23/2021</a:t>
             </a:fld>
             <a:endParaRPr lang="en-US" dirty="0"/>
           </a:p>
@@ -1053,7 +1053,7 @@
           </a:lstStyle>
           <a:p>
             <a:r>
-              <a:rPr lang="es-ES" smtClean="0"/>
+              <a:rPr lang="es-ES"/>
               <a:t>Haga clic para modificar el estilo de título del patrón</a:t>
             </a:r>
             <a:endParaRPr lang="en-US" dirty="0"/>
@@ -1119,7 +1119,7 @@
           <a:p>
             <a:pPr lvl="0"/>
             <a:r>
-              <a:rPr lang="es-ES" smtClean="0"/>
+              <a:rPr lang="es-ES"/>
               <a:t>Haga clic para modificar el estilo de texto del patrón</a:t>
             </a:r>
           </a:p>
@@ -1142,7 +1142,7 @@
           <a:p>
             <a:fld id="{84EB90BD-B6CE-46B7-997F-7313B992CCDC}" type="datetimeFigureOut">
               <a:rPr lang="en-US" dirty="0"/>
-              <a:t>6/21/2021</a:t>
+              <a:t>6/23/2021</a:t>
             </a:fld>
             <a:endParaRPr lang="en-US" dirty="0"/>
           </a:p>
@@ -1384,7 +1384,7 @@
           </a:lstStyle>
           <a:p>
             <a:r>
-              <a:rPr lang="es-ES" smtClean="0"/>
+              <a:rPr lang="es-ES"/>
               <a:t>Haga clic para modificar el estilo de título del patrón</a:t>
             </a:r>
             <a:endParaRPr lang="en-US" dirty="0"/>
@@ -1452,7 +1452,7 @@
           <a:p>
             <a:pPr lvl="0"/>
             <a:r>
-              <a:rPr lang="es-ES" smtClean="0"/>
+              <a:rPr lang="es-ES"/>
               <a:t>Haga clic para modificar el estilo de texto del patrón</a:t>
             </a:r>
           </a:p>
@@ -1519,7 +1519,7 @@
           <a:p>
             <a:pPr lvl="0"/>
             <a:r>
-              <a:rPr lang="es-ES" smtClean="0"/>
+              <a:rPr lang="es-ES"/>
               <a:t>Haga clic para modificar el estilo de texto del patrón</a:t>
             </a:r>
           </a:p>
@@ -1542,7 +1542,7 @@
           <a:p>
             <a:fld id="{CDB9D11F-B188-461D-B23F-39381795C052}" type="datetimeFigureOut">
               <a:rPr lang="en-US" dirty="0"/>
-              <a:t>6/21/2021</a:t>
+              <a:t>6/23/2021</a:t>
             </a:fld>
             <a:endParaRPr lang="en-US" dirty="0"/>
           </a:p>
@@ -2016,7 +2016,7 @@
           </a:lstStyle>
           <a:p>
             <a:r>
-              <a:rPr lang="es-ES" smtClean="0"/>
+              <a:rPr lang="es-ES"/>
               <a:t>Haga clic para modificar el estilo de título del patrón</a:t>
             </a:r>
             <a:endParaRPr lang="en-US" dirty="0"/>
@@ -2082,7 +2082,7 @@
           <a:p>
             <a:pPr lvl="0"/>
             <a:r>
-              <a:rPr lang="es-ES" smtClean="0"/>
+              <a:rPr lang="es-ES"/>
               <a:t>Haga clic para modificar el estilo de texto del patrón</a:t>
             </a:r>
           </a:p>
@@ -2105,7 +2105,7 @@
           <a:p>
             <a:fld id="{52E6D8D9-55A2-4063-B0F3-121F44549695}" type="datetimeFigureOut">
               <a:rPr lang="en-US" dirty="0"/>
-              <a:t>6/21/2021</a:t>
+              <a:t>6/23/2021</a:t>
             </a:fld>
             <a:endParaRPr lang="en-US" dirty="0"/>
           </a:p>
@@ -2343,7 +2343,7 @@
           <a:lstStyle/>
           <a:p>
             <a:r>
-              <a:rPr lang="es-ES" smtClean="0"/>
+              <a:rPr lang="es-ES"/>
               <a:t>Haga clic para modificar el estilo de título del patrón</a:t>
             </a:r>
             <a:endParaRPr lang="en-US" dirty="0"/>
@@ -2415,7 +2415,7 @@
           <a:p>
             <a:pPr lvl="0"/>
             <a:r>
-              <a:rPr lang="es-ES" smtClean="0"/>
+              <a:rPr lang="es-ES"/>
               <a:t>Haga clic para modificar el estilo de texto del patrón</a:t>
             </a:r>
           </a:p>
@@ -2482,7 +2482,7 @@
           <a:p>
             <a:pPr lvl="0"/>
             <a:r>
-              <a:rPr lang="es-ES" smtClean="0"/>
+              <a:rPr lang="es-ES"/>
               <a:t>Haga clic para modificar el estilo de texto del patrón</a:t>
             </a:r>
           </a:p>
@@ -2553,7 +2553,7 @@
           <a:p>
             <a:pPr lvl="0"/>
             <a:r>
-              <a:rPr lang="es-ES" smtClean="0"/>
+              <a:rPr lang="es-ES"/>
               <a:t>Haga clic para modificar el estilo de texto del patrón</a:t>
             </a:r>
           </a:p>
@@ -2620,7 +2620,7 @@
           <a:p>
             <a:pPr lvl="0"/>
             <a:r>
-              <a:rPr lang="es-ES" smtClean="0"/>
+              <a:rPr lang="es-ES"/>
               <a:t>Haga clic para modificar el estilo de texto del patrón</a:t>
             </a:r>
           </a:p>
@@ -2691,7 +2691,7 @@
           <a:p>
             <a:pPr lvl="0"/>
             <a:r>
-              <a:rPr lang="es-ES" smtClean="0"/>
+              <a:rPr lang="es-ES"/>
               <a:t>Haga clic para modificar el estilo de texto del patrón</a:t>
             </a:r>
           </a:p>
@@ -2758,7 +2758,7 @@
           <a:p>
             <a:pPr lvl="0"/>
             <a:r>
-              <a:rPr lang="es-ES" smtClean="0"/>
+              <a:rPr lang="es-ES"/>
               <a:t>Haga clic para modificar el estilo de texto del patrón</a:t>
             </a:r>
           </a:p>
@@ -2781,7 +2781,7 @@
           <a:p>
             <a:fld id="{D4B24536-994D-4021-A283-9F449C0DB509}" type="datetimeFigureOut">
               <a:rPr lang="en-US" dirty="0"/>
-              <a:t>6/21/2021</a:t>
+              <a:t>6/23/2021</a:t>
             </a:fld>
             <a:endParaRPr lang="en-US" dirty="0"/>
           </a:p>
@@ -3014,7 +3014,7 @@
           <a:lstStyle/>
           <a:p>
             <a:r>
-              <a:rPr lang="es-ES" smtClean="0"/>
+              <a:rPr lang="es-ES"/>
               <a:t>Haga clic para modificar el estilo de título del patrón</a:t>
             </a:r>
             <a:endParaRPr lang="en-US" dirty="0"/>
@@ -3086,7 +3086,7 @@
           <a:p>
             <a:pPr lvl="0"/>
             <a:r>
-              <a:rPr lang="es-ES" smtClean="0"/>
+              <a:rPr lang="es-ES"/>
               <a:t>Haga clic para modificar el estilo de texto del patrón</a:t>
             </a:r>
           </a:p>
@@ -3164,7 +3164,7 @@
           </a:lstStyle>
           <a:p>
             <a:r>
-              <a:rPr lang="es-ES" smtClean="0"/>
+              <a:rPr lang="es-ES"/>
               <a:t>Haga clic en el icono para agregar una imagen</a:t>
             </a:r>
             <a:endParaRPr lang="en-US" dirty="0"/>
@@ -3232,7 +3232,7 @@
           <a:p>
             <a:pPr lvl="0"/>
             <a:r>
-              <a:rPr lang="es-ES" smtClean="0"/>
+              <a:rPr lang="es-ES"/>
               <a:t>Haga clic para modificar el estilo de texto del patrón</a:t>
             </a:r>
           </a:p>
@@ -3303,7 +3303,7 @@
           <a:p>
             <a:pPr lvl="0"/>
             <a:r>
-              <a:rPr lang="es-ES" smtClean="0"/>
+              <a:rPr lang="es-ES"/>
               <a:t>Haga clic para modificar el estilo de texto del patrón</a:t>
             </a:r>
           </a:p>
@@ -3381,7 +3381,7 @@
           </a:lstStyle>
           <a:p>
             <a:r>
-              <a:rPr lang="es-ES" smtClean="0"/>
+              <a:rPr lang="es-ES"/>
               <a:t>Haga clic en el icono para agregar una imagen</a:t>
             </a:r>
             <a:endParaRPr lang="en-US" dirty="0"/>
@@ -3449,7 +3449,7 @@
           <a:p>
             <a:pPr lvl="0"/>
             <a:r>
-              <a:rPr lang="es-ES" smtClean="0"/>
+              <a:rPr lang="es-ES"/>
               <a:t>Haga clic para modificar el estilo de texto del patrón</a:t>
             </a:r>
           </a:p>
@@ -3520,7 +3520,7 @@
           <a:p>
             <a:pPr lvl="0"/>
             <a:r>
-              <a:rPr lang="es-ES" smtClean="0"/>
+              <a:rPr lang="es-ES"/>
               <a:t>Haga clic para modificar el estilo de texto del patrón</a:t>
             </a:r>
           </a:p>
@@ -3598,7 +3598,7 @@
           </a:lstStyle>
           <a:p>
             <a:r>
-              <a:rPr lang="es-ES" smtClean="0"/>
+              <a:rPr lang="es-ES"/>
               <a:t>Haga clic en el icono para agregar una imagen</a:t>
             </a:r>
             <a:endParaRPr lang="en-US" dirty="0"/>
@@ -3666,7 +3666,7 @@
           <a:p>
             <a:pPr lvl="0"/>
             <a:r>
-              <a:rPr lang="es-ES" smtClean="0"/>
+              <a:rPr lang="es-ES"/>
               <a:t>Haga clic para modificar el estilo de texto del patrón</a:t>
             </a:r>
           </a:p>
@@ -3689,7 +3689,7 @@
           <a:p>
             <a:fld id="{3CBBBB78-C96F-47B7-AB17-D852CA960AC9}" type="datetimeFigureOut">
               <a:rPr lang="en-US" dirty="0"/>
-              <a:t>6/21/2021</a:t>
+              <a:t>6/23/2021</a:t>
             </a:fld>
             <a:endParaRPr lang="en-US" dirty="0"/>
           </a:p>
@@ -3921,7 +3921,7 @@
           </a:lstStyle>
           <a:p>
             <a:r>
-              <a:rPr lang="es-ES" smtClean="0"/>
+              <a:rPr lang="es-ES"/>
               <a:t>Haga clic para modificar el estilo de título del patrón</a:t>
             </a:r>
             <a:endParaRPr lang="en-US" dirty="0"/>
@@ -3945,35 +3945,35 @@
           <a:p>
             <a:pPr lvl="0"/>
             <a:r>
-              <a:rPr lang="es-ES" smtClean="0"/>
+              <a:rPr lang="es-ES"/>
               <a:t>Haga clic para modificar el estilo de texto del patrón</a:t>
             </a:r>
           </a:p>
           <a:p>
             <a:pPr lvl="1"/>
             <a:r>
-              <a:rPr lang="es-ES" smtClean="0"/>
+              <a:rPr lang="es-ES"/>
               <a:t>Segundo nivel</a:t>
             </a:r>
           </a:p>
           <a:p>
             <a:pPr lvl="2"/>
             <a:r>
-              <a:rPr lang="es-ES" smtClean="0"/>
+              <a:rPr lang="es-ES"/>
               <a:t>Tercer nivel</a:t>
             </a:r>
           </a:p>
           <a:p>
             <a:pPr lvl="3"/>
             <a:r>
-              <a:rPr lang="es-ES" smtClean="0"/>
+              <a:rPr lang="es-ES"/>
               <a:t>Cuarto nivel</a:t>
             </a:r>
           </a:p>
           <a:p>
             <a:pPr lvl="4"/>
             <a:r>
-              <a:rPr lang="es-ES" smtClean="0"/>
+              <a:rPr lang="es-ES"/>
               <a:t>Quinto nivel</a:t>
             </a:r>
             <a:endParaRPr lang="en-US" dirty="0"/>
@@ -3997,7 +3997,7 @@
           <a:p>
             <a:fld id="{1FA3F48C-C7C6-4055-9F49-3777875E72AE}" type="datetimeFigureOut">
               <a:rPr lang="en-US" dirty="0"/>
-              <a:t>6/21/2021</a:t>
+              <a:t>6/23/2021</a:t>
             </a:fld>
             <a:endParaRPr lang="en-US" dirty="0"/>
           </a:p>
@@ -4170,7 +4170,7 @@
           <a:lstStyle/>
           <a:p>
             <a:r>
-              <a:rPr lang="es-ES" smtClean="0"/>
+              <a:rPr lang="es-ES"/>
               <a:t>Haga clic para modificar el estilo de título del patrón</a:t>
             </a:r>
             <a:endParaRPr lang="en-US" dirty="0"/>
@@ -4199,35 +4199,35 @@
           <a:p>
             <a:pPr lvl="0"/>
             <a:r>
-              <a:rPr lang="es-ES" smtClean="0"/>
+              <a:rPr lang="es-ES"/>
               <a:t>Haga clic para modificar el estilo de texto del patrón</a:t>
             </a:r>
           </a:p>
           <a:p>
             <a:pPr lvl="1"/>
             <a:r>
-              <a:rPr lang="es-ES" smtClean="0"/>
+              <a:rPr lang="es-ES"/>
               <a:t>Segundo nivel</a:t>
             </a:r>
           </a:p>
           <a:p>
             <a:pPr lvl="2"/>
             <a:r>
-              <a:rPr lang="es-ES" smtClean="0"/>
+              <a:rPr lang="es-ES"/>
               <a:t>Tercer nivel</a:t>
             </a:r>
           </a:p>
           <a:p>
             <a:pPr lvl="3"/>
             <a:r>
-              <a:rPr lang="es-ES" smtClean="0"/>
+              <a:rPr lang="es-ES"/>
               <a:t>Cuarto nivel</a:t>
             </a:r>
           </a:p>
           <a:p>
             <a:pPr lvl="4"/>
             <a:r>
-              <a:rPr lang="es-ES" smtClean="0"/>
+              <a:rPr lang="es-ES"/>
               <a:t>Quinto nivel</a:t>
             </a:r>
             <a:endParaRPr lang="en-US" dirty="0"/>
@@ -4256,7 +4256,7 @@
           <a:p>
             <a:fld id="{6178E61D-D431-422C-9764-11DAFE33AB63}" type="datetimeFigureOut">
               <a:rPr lang="en-US" dirty="0"/>
-              <a:t>6/21/2021</a:t>
+              <a:t>6/23/2021</a:t>
             </a:fld>
             <a:endParaRPr lang="en-US" dirty="0"/>
           </a:p>
@@ -4499,7 +4499,7 @@
           <a:lstStyle/>
           <a:p>
             <a:r>
-              <a:rPr lang="es-ES" smtClean="0"/>
+              <a:rPr lang="es-ES"/>
               <a:t>Haga clic para modificar el estilo de título del patrón</a:t>
             </a:r>
             <a:endParaRPr lang="en-US" dirty="0"/>
@@ -4523,35 +4523,35 @@
           <a:p>
             <a:pPr lvl="0"/>
             <a:r>
-              <a:rPr lang="es-ES" smtClean="0"/>
+              <a:rPr lang="es-ES"/>
               <a:t>Haga clic para modificar el estilo de texto del patrón</a:t>
             </a:r>
           </a:p>
           <a:p>
             <a:pPr lvl="1"/>
             <a:r>
-              <a:rPr lang="es-ES" smtClean="0"/>
+              <a:rPr lang="es-ES"/>
               <a:t>Segundo nivel</a:t>
             </a:r>
           </a:p>
           <a:p>
             <a:pPr lvl="2"/>
             <a:r>
-              <a:rPr lang="es-ES" smtClean="0"/>
+              <a:rPr lang="es-ES"/>
               <a:t>Tercer nivel</a:t>
             </a:r>
           </a:p>
           <a:p>
             <a:pPr lvl="3"/>
             <a:r>
-              <a:rPr lang="es-ES" smtClean="0"/>
+              <a:rPr lang="es-ES"/>
               <a:t>Cuarto nivel</a:t>
             </a:r>
           </a:p>
           <a:p>
             <a:pPr lvl="4"/>
             <a:r>
-              <a:rPr lang="es-ES" smtClean="0"/>
+              <a:rPr lang="es-ES"/>
               <a:t>Quinto nivel</a:t>
             </a:r>
             <a:endParaRPr lang="en-US" dirty="0"/>
@@ -4575,7 +4575,7 @@
           <a:p>
             <a:fld id="{12DE42F4-6EEF-4EF7-8ED4-2208F0F89A08}" type="datetimeFigureOut">
               <a:rPr lang="en-US" dirty="0"/>
-              <a:t>6/21/2021</a:t>
+              <a:t>6/23/2021</a:t>
             </a:fld>
             <a:endParaRPr lang="en-US" dirty="0"/>
           </a:p>
@@ -4814,7 +4814,7 @@
           </a:lstStyle>
           <a:p>
             <a:r>
-              <a:rPr lang="es-ES" smtClean="0"/>
+              <a:rPr lang="es-ES"/>
               <a:t>Haga clic para modificar el estilo de título del patrón</a:t>
             </a:r>
             <a:endParaRPr lang="en-US" dirty="0"/>
@@ -4936,7 +4936,7 @@
           <a:p>
             <a:pPr lvl="0"/>
             <a:r>
-              <a:rPr lang="es-ES" smtClean="0"/>
+              <a:rPr lang="es-ES"/>
               <a:t>Haga clic para modificar el estilo de texto del patrón</a:t>
             </a:r>
           </a:p>
@@ -4959,7 +4959,7 @@
           <a:p>
             <a:fld id="{30578ACC-22D6-47C1-A373-4FD133E34F3C}" type="datetimeFigureOut">
               <a:rPr lang="en-US" dirty="0"/>
-              <a:t>6/21/2021</a:t>
+              <a:t>6/23/2021</a:t>
             </a:fld>
             <a:endParaRPr lang="en-US" dirty="0"/>
           </a:p>
@@ -5192,7 +5192,7 @@
           <a:lstStyle/>
           <a:p>
             <a:r>
-              <a:rPr lang="es-ES" smtClean="0"/>
+              <a:rPr lang="es-ES"/>
               <a:t>Haga clic para modificar el estilo de título del patrón</a:t>
             </a:r>
             <a:endParaRPr lang="en-US" dirty="0"/>
@@ -5221,35 +5221,35 @@
           <a:p>
             <a:pPr lvl="0"/>
             <a:r>
-              <a:rPr lang="es-ES" smtClean="0"/>
+              <a:rPr lang="es-ES"/>
               <a:t>Haga clic para modificar el estilo de texto del patrón</a:t>
             </a:r>
           </a:p>
           <a:p>
             <a:pPr lvl="1"/>
             <a:r>
-              <a:rPr lang="es-ES" smtClean="0"/>
+              <a:rPr lang="es-ES"/>
               <a:t>Segundo nivel</a:t>
             </a:r>
           </a:p>
           <a:p>
             <a:pPr lvl="2"/>
             <a:r>
-              <a:rPr lang="es-ES" smtClean="0"/>
+              <a:rPr lang="es-ES"/>
               <a:t>Tercer nivel</a:t>
             </a:r>
           </a:p>
           <a:p>
             <a:pPr lvl="3"/>
             <a:r>
-              <a:rPr lang="es-ES" smtClean="0"/>
+              <a:rPr lang="es-ES"/>
               <a:t>Cuarto nivel</a:t>
             </a:r>
           </a:p>
           <a:p>
             <a:pPr lvl="4"/>
             <a:r>
-              <a:rPr lang="es-ES" smtClean="0"/>
+              <a:rPr lang="es-ES"/>
               <a:t>Quinto nivel</a:t>
             </a:r>
             <a:endParaRPr lang="en-US" dirty="0"/>
@@ -5278,35 +5278,35 @@
           <a:p>
             <a:pPr lvl="0"/>
             <a:r>
-              <a:rPr lang="es-ES" smtClean="0"/>
+              <a:rPr lang="es-ES"/>
               <a:t>Haga clic para modificar el estilo de texto del patrón</a:t>
             </a:r>
           </a:p>
           <a:p>
             <a:pPr lvl="1"/>
             <a:r>
-              <a:rPr lang="es-ES" smtClean="0"/>
+              <a:rPr lang="es-ES"/>
               <a:t>Segundo nivel</a:t>
             </a:r>
           </a:p>
           <a:p>
             <a:pPr lvl="2"/>
             <a:r>
-              <a:rPr lang="es-ES" smtClean="0"/>
+              <a:rPr lang="es-ES"/>
               <a:t>Tercer nivel</a:t>
             </a:r>
           </a:p>
           <a:p>
             <a:pPr lvl="3"/>
             <a:r>
-              <a:rPr lang="es-ES" smtClean="0"/>
+              <a:rPr lang="es-ES"/>
               <a:t>Cuarto nivel</a:t>
             </a:r>
           </a:p>
           <a:p>
             <a:pPr lvl="4"/>
             <a:r>
-              <a:rPr lang="es-ES" smtClean="0"/>
+              <a:rPr lang="es-ES"/>
               <a:t>Quinto nivel</a:t>
             </a:r>
             <a:endParaRPr lang="en-US" dirty="0"/>
@@ -5330,7 +5330,7 @@
           <a:p>
             <a:fld id="{4E5A6C69-6797-4E8A-BF37-F2C3751466E9}" type="datetimeFigureOut">
               <a:rPr lang="en-US" dirty="0"/>
-              <a:t>6/21/2021</a:t>
+              <a:t>6/23/2021</a:t>
             </a:fld>
             <a:endParaRPr lang="en-US" dirty="0"/>
           </a:p>
@@ -5563,7 +5563,7 @@
           <a:lstStyle/>
           <a:p>
             <a:r>
-              <a:rPr lang="es-ES" smtClean="0"/>
+              <a:rPr lang="es-ES"/>
               <a:t>Haga clic para modificar el estilo de título del patrón</a:t>
             </a:r>
             <a:endParaRPr lang="en-US" dirty="0"/>
@@ -5629,7 +5629,7 @@
           <a:p>
             <a:pPr lvl="0"/>
             <a:r>
-              <a:rPr lang="es-ES" smtClean="0"/>
+              <a:rPr lang="es-ES"/>
               <a:t>Haga clic para modificar el estilo de texto del patrón</a:t>
             </a:r>
           </a:p>
@@ -5657,35 +5657,35 @@
           <a:p>
             <a:pPr lvl="0"/>
             <a:r>
-              <a:rPr lang="es-ES" smtClean="0"/>
+              <a:rPr lang="es-ES"/>
               <a:t>Haga clic para modificar el estilo de texto del patrón</a:t>
             </a:r>
           </a:p>
           <a:p>
             <a:pPr lvl="1"/>
             <a:r>
-              <a:rPr lang="es-ES" smtClean="0"/>
+              <a:rPr lang="es-ES"/>
               <a:t>Segundo nivel</a:t>
             </a:r>
           </a:p>
           <a:p>
             <a:pPr lvl="2"/>
             <a:r>
-              <a:rPr lang="es-ES" smtClean="0"/>
+              <a:rPr lang="es-ES"/>
               <a:t>Tercer nivel</a:t>
             </a:r>
           </a:p>
           <a:p>
             <a:pPr lvl="3"/>
             <a:r>
-              <a:rPr lang="es-ES" smtClean="0"/>
+              <a:rPr lang="es-ES"/>
               <a:t>Cuarto nivel</a:t>
             </a:r>
           </a:p>
           <a:p>
             <a:pPr lvl="4"/>
             <a:r>
-              <a:rPr lang="es-ES" smtClean="0"/>
+              <a:rPr lang="es-ES"/>
               <a:t>Quinto nivel</a:t>
             </a:r>
             <a:endParaRPr lang="en-US" dirty="0"/>
@@ -5751,7 +5751,7 @@
           <a:p>
             <a:pPr lvl="0"/>
             <a:r>
-              <a:rPr lang="es-ES" smtClean="0"/>
+              <a:rPr lang="es-ES"/>
               <a:t>Haga clic para modificar el estilo de texto del patrón</a:t>
             </a:r>
           </a:p>
@@ -5779,35 +5779,35 @@
           <a:p>
             <a:pPr lvl="0"/>
             <a:r>
-              <a:rPr lang="es-ES" smtClean="0"/>
+              <a:rPr lang="es-ES"/>
               <a:t>Haga clic para modificar el estilo de texto del patrón</a:t>
             </a:r>
           </a:p>
           <a:p>
             <a:pPr lvl="1"/>
             <a:r>
-              <a:rPr lang="es-ES" smtClean="0"/>
+              <a:rPr lang="es-ES"/>
               <a:t>Segundo nivel</a:t>
             </a:r>
           </a:p>
           <a:p>
             <a:pPr lvl="2"/>
             <a:r>
-              <a:rPr lang="es-ES" smtClean="0"/>
+              <a:rPr lang="es-ES"/>
               <a:t>Tercer nivel</a:t>
             </a:r>
           </a:p>
           <a:p>
             <a:pPr lvl="3"/>
             <a:r>
-              <a:rPr lang="es-ES" smtClean="0"/>
+              <a:rPr lang="es-ES"/>
               <a:t>Cuarto nivel</a:t>
             </a:r>
           </a:p>
           <a:p>
             <a:pPr lvl="4"/>
             <a:r>
-              <a:rPr lang="es-ES" smtClean="0"/>
+              <a:rPr lang="es-ES"/>
               <a:t>Quinto nivel</a:t>
             </a:r>
             <a:endParaRPr lang="en-US" dirty="0"/>
@@ -5831,7 +5831,7 @@
           <a:p>
             <a:fld id="{D82014A1-A632-4878-A0D3-F52BA7563730}" type="datetimeFigureOut">
               <a:rPr lang="en-US" dirty="0"/>
-              <a:t>6/21/2021</a:t>
+              <a:t>6/23/2021</a:t>
             </a:fld>
             <a:endParaRPr lang="en-US" dirty="0"/>
           </a:p>
@@ -6059,7 +6059,7 @@
           <a:lstStyle/>
           <a:p>
             <a:r>
-              <a:rPr lang="es-ES" smtClean="0"/>
+              <a:rPr lang="es-ES"/>
               <a:t>Haga clic para modificar el estilo de título del patrón</a:t>
             </a:r>
             <a:endParaRPr lang="en-US" dirty="0"/>
@@ -6083,7 +6083,7 @@
           <a:p>
             <a:fld id="{CE99F462-093F-4566-844B-4C71F2739DA5}" type="datetimeFigureOut">
               <a:rPr lang="en-US" dirty="0"/>
-              <a:t>6/21/2021</a:t>
+              <a:t>6/23/2021</a:t>
             </a:fld>
             <a:endParaRPr lang="en-US" dirty="0"/>
           </a:p>
@@ -6241,7 +6241,7 @@
           <a:p>
             <a:fld id="{3D24A7AC-904D-4781-85BA-7D10C17ED021}" type="datetimeFigureOut">
               <a:rPr lang="en-US" dirty="0"/>
-              <a:t>6/21/2021</a:t>
+              <a:t>6/23/2021</a:t>
             </a:fld>
             <a:endParaRPr lang="en-US" dirty="0"/>
           </a:p>
@@ -6480,7 +6480,7 @@
           </a:lstStyle>
           <a:p>
             <a:r>
-              <a:rPr lang="es-ES" smtClean="0"/>
+              <a:rPr lang="es-ES"/>
               <a:t>Haga clic para modificar el estilo de título del patrón</a:t>
             </a:r>
             <a:endParaRPr lang="en-US" dirty="0"/>
@@ -6509,35 +6509,35 @@
           <a:p>
             <a:pPr lvl="0"/>
             <a:r>
-              <a:rPr lang="es-ES" smtClean="0"/>
+              <a:rPr lang="es-ES"/>
               <a:t>Haga clic para modificar el estilo de texto del patrón</a:t>
             </a:r>
           </a:p>
           <a:p>
             <a:pPr lvl="1"/>
             <a:r>
-              <a:rPr lang="es-ES" smtClean="0"/>
+              <a:rPr lang="es-ES"/>
               <a:t>Segundo nivel</a:t>
             </a:r>
           </a:p>
           <a:p>
             <a:pPr lvl="2"/>
             <a:r>
-              <a:rPr lang="es-ES" smtClean="0"/>
+              <a:rPr lang="es-ES"/>
               <a:t>Tercer nivel</a:t>
             </a:r>
           </a:p>
           <a:p>
             <a:pPr lvl="3"/>
             <a:r>
-              <a:rPr lang="es-ES" smtClean="0"/>
+              <a:rPr lang="es-ES"/>
               <a:t>Cuarto nivel</a:t>
             </a:r>
           </a:p>
           <a:p>
             <a:pPr lvl="4"/>
             <a:r>
-              <a:rPr lang="es-ES" smtClean="0"/>
+              <a:rPr lang="es-ES"/>
               <a:t>Quinto nivel</a:t>
             </a:r>
             <a:endParaRPr lang="en-US" dirty="0"/>
@@ -6603,7 +6603,7 @@
           <a:p>
             <a:pPr lvl="0"/>
             <a:r>
-              <a:rPr lang="es-ES" smtClean="0"/>
+              <a:rPr lang="es-ES"/>
               <a:t>Haga clic para modificar el estilo de texto del patrón</a:t>
             </a:r>
           </a:p>
@@ -6626,7 +6626,7 @@
           <a:p>
             <a:fld id="{E331444B-B92B-4E27-8C94-BB93EAF5CB18}" type="datetimeFigureOut">
               <a:rPr lang="en-US" dirty="0"/>
-              <a:t>6/21/2021</a:t>
+              <a:t>6/23/2021</a:t>
             </a:fld>
             <a:endParaRPr lang="en-US" dirty="0"/>
           </a:p>
@@ -6865,7 +6865,7 @@
           </a:lstStyle>
           <a:p>
             <a:r>
-              <a:rPr lang="es-ES" smtClean="0"/>
+              <a:rPr lang="es-ES"/>
               <a:t>Haga clic para modificar el estilo de título del patrón</a:t>
             </a:r>
             <a:endParaRPr lang="en-US" dirty="0"/>
@@ -6941,7 +6941,7 @@
           </a:lstStyle>
           <a:p>
             <a:r>
-              <a:rPr lang="es-ES" smtClean="0"/>
+              <a:rPr lang="es-ES"/>
               <a:t>Haga clic en el icono para agregar una imagen</a:t>
             </a:r>
             <a:endParaRPr lang="en-US" dirty="0"/>
@@ -7007,7 +7007,7 @@
           <a:p>
             <a:pPr lvl="0"/>
             <a:r>
-              <a:rPr lang="es-ES" smtClean="0"/>
+              <a:rPr lang="es-ES"/>
               <a:t>Haga clic para modificar el estilo de texto del patrón</a:t>
             </a:r>
           </a:p>
@@ -7030,7 +7030,7 @@
           <a:p>
             <a:fld id="{363EFA5E-FA76-400D-B3DC-F0BA90E6D107}" type="datetimeFigureOut">
               <a:rPr lang="en-US" dirty="0"/>
-              <a:t>6/21/2021</a:t>
+              <a:t>6/23/2021</a:t>
             </a:fld>
             <a:endParaRPr lang="en-US" dirty="0"/>
           </a:p>
@@ -7165,7 +7165,7 @@
           <a:lstStyle/>
           <a:p>
             <a:r>
-              <a:rPr lang="es-ES" smtClean="0"/>
+              <a:rPr lang="es-ES"/>
               <a:t>Haga clic para modificar el estilo de título del patrón</a:t>
             </a:r>
             <a:endParaRPr lang="en-US" dirty="0"/>
@@ -7199,35 +7199,35 @@
           <a:p>
             <a:pPr lvl="0"/>
             <a:r>
-              <a:rPr lang="es-ES" smtClean="0"/>
+              <a:rPr lang="es-ES"/>
               <a:t>Haga clic para modificar el estilo de texto del patrón</a:t>
             </a:r>
           </a:p>
           <a:p>
             <a:pPr lvl="1"/>
             <a:r>
-              <a:rPr lang="es-ES" smtClean="0"/>
+              <a:rPr lang="es-ES"/>
               <a:t>Segundo nivel</a:t>
             </a:r>
           </a:p>
           <a:p>
             <a:pPr lvl="2"/>
             <a:r>
-              <a:rPr lang="es-ES" smtClean="0"/>
+              <a:rPr lang="es-ES"/>
               <a:t>Tercer nivel</a:t>
             </a:r>
           </a:p>
           <a:p>
             <a:pPr lvl="3"/>
             <a:r>
-              <a:rPr lang="es-ES" smtClean="0"/>
+              <a:rPr lang="es-ES"/>
               <a:t>Cuarto nivel</a:t>
             </a:r>
           </a:p>
           <a:p>
             <a:pPr lvl="4"/>
             <a:r>
-              <a:rPr lang="es-ES" smtClean="0"/>
+              <a:rPr lang="es-ES"/>
               <a:t>Quinto nivel</a:t>
             </a:r>
             <a:endParaRPr lang="en-US" dirty="0"/>
@@ -7269,7 +7269,7 @@
           <a:p>
             <a:fld id="{9D6E9DEC-419B-4CC5-A080-3B06BD5A8291}" type="datetimeFigureOut">
               <a:rPr lang="en-US" dirty="0"/>
-              <a:t>6/21/2021</a:t>
+              <a:t>6/23/2021</a:t>
             </a:fld>
             <a:endParaRPr lang="en-US" dirty="0"/>
           </a:p>
@@ -7698,26 +7698,17 @@
           <a:lstStyle/>
           <a:p>
             <a:r>
-              <a:rPr lang="es-PE" sz="4800" dirty="0" smtClean="0"/>
-              <a:t>PROYECTO </a:t>
-            </a:r>
-            <a:r>
-              <a:rPr lang="es-PE" sz="4800" dirty="0" smtClean="0"/>
-              <a:t>LP2 - </a:t>
-            </a:r>
-            <a:r>
-              <a:rPr lang="es-PE" sz="4800" dirty="0" err="1" smtClean="0"/>
-              <a:t>CiberI</a:t>
-            </a:r>
-            <a:r>
-              <a:rPr lang="es-PE" sz="4800" dirty="0" err="1" smtClean="0"/>
-              <a:t>mpacto</a:t>
-            </a:r>
-            <a:r>
-              <a:rPr lang="es-PE" sz="4800" dirty="0" smtClean="0"/>
+              <a:rPr lang="es-PE" sz="4800" dirty="0"/>
+              <a:t>PROYECTO LP2 - </a:t>
+            </a:r>
+            <a:r>
+              <a:rPr lang="es-PE" sz="4800" dirty="0" err="1"/>
+              <a:t>CiberImpacto</a:t>
+            </a:r>
+            <a:r>
+              <a:rPr lang="es-PE" sz="4800" dirty="0"/>
               <a:t> </a:t>
             </a:r>
-            <a:endParaRPr lang="es-PE" sz="4800" dirty="0"/>
           </a:p>
         </p:txBody>
       </p:sp>
@@ -7745,14 +7736,9 @@
           <a:p>
             <a:pPr algn="r"/>
             <a:r>
-              <a:rPr lang="es-PE" sz="5400" dirty="0" smtClean="0"/>
-              <a:t>Sección </a:t>
-            </a:r>
-            <a:r>
-              <a:rPr lang="es-PE" sz="5400" dirty="0" smtClean="0"/>
-              <a:t>T4KM</a:t>
-            </a:r>
-            <a:endParaRPr lang="es-PE" sz="5400" dirty="0"/>
+              <a:rPr lang="es-PE" sz="5400" dirty="0"/>
+              <a:t>Sección T4KM</a:t>
+            </a:r>
           </a:p>
         </p:txBody>
       </p:sp>
@@ -7766,13 +7752,6 @@
   <p:clrMapOvr>
     <a:masterClrMapping/>
   </p:clrMapOvr>
-  <p:timing>
-    <p:tnLst>
-      <p:par>
-        <p:cTn id="1" dur="indefinite" restart="never" nodeType="tmRoot"/>
-      </p:par>
-    </p:tnLst>
-  </p:timing>
 </p:sld>
 </file>
 
@@ -7809,10 +7788,9 @@
           <a:lstStyle/>
           <a:p>
             <a:r>
-              <a:rPr lang="es-PE" dirty="0" smtClean="0"/>
+              <a:rPr lang="es-PE" dirty="0"/>
               <a:t>Vista previa del código</a:t>
             </a:r>
-            <a:endParaRPr lang="es-PE" dirty="0"/>
           </a:p>
         </p:txBody>
       </p:sp>
@@ -7828,14 +7806,13 @@
         </p:nvPicPr>
         <p:blipFill>
           <a:blip r:embed="rId2"/>
-          <a:stretch>
-            <a:fillRect/>
-          </a:stretch>
+          <a:srcRect/>
+          <a:stretch/>
         </p:blipFill>
         <p:spPr>
           <a:xfrm>
-            <a:off x="2408183" y="2319285"/>
-            <a:ext cx="6158135" cy="3903761"/>
+            <a:off x="2408183" y="2694840"/>
+            <a:ext cx="6158135" cy="3152651"/>
           </a:xfrm>
           <a:prstGeom prst="rect">
             <a:avLst/>
@@ -7852,13 +7829,6 @@
   <p:clrMapOvr>
     <a:masterClrMapping/>
   </p:clrMapOvr>
-  <p:timing>
-    <p:tnLst>
-      <p:par>
-        <p:cTn id="1" dur="indefinite" restart="never" nodeType="tmRoot"/>
-      </p:par>
-    </p:tnLst>
-  </p:timing>
 </p:sld>
 </file>
 
@@ -7895,10 +7865,9 @@
           <a:lstStyle/>
           <a:p>
             <a:r>
-              <a:rPr lang="es-PE" dirty="0" smtClean="0"/>
-              <a:t>FRAME MANTENIMIENTO DE USUARIOS</a:t>
-            </a:r>
-            <a:endParaRPr lang="es-PE" dirty="0"/>
+              <a:rPr lang="es-PE" dirty="0"/>
+              <a:t>FRAME MANTENIMIENTO DE PRODUCTOS</a:t>
+            </a:r>
           </a:p>
         </p:txBody>
       </p:sp>
@@ -7920,18 +7889,9 @@
           <a:lstStyle/>
           <a:p>
             <a:r>
-              <a:rPr lang="es-PE" sz="2400" dirty="0" smtClean="0"/>
-              <a:t>Enfocado a la gestión de usuarios, en donde se pueda administrar sus datos </a:t>
-            </a:r>
-            <a:r>
-              <a:rPr lang="es-PE" sz="2400" dirty="0" smtClean="0"/>
-              <a:t>personales y </a:t>
-            </a:r>
-            <a:r>
-              <a:rPr lang="es-PE" sz="2400" dirty="0" smtClean="0"/>
-              <a:t>sus credenciales de ingreso.</a:t>
-            </a:r>
-            <a:endParaRPr lang="es-PE" sz="2400" dirty="0"/>
+              <a:rPr lang="es-PE" sz="2400" dirty="0"/>
+              <a:t>Enfocado a la gestión de productos, en donde se pueda administrar sus datos y podrás añadir nuevos productos.</a:t>
+            </a:r>
           </a:p>
         </p:txBody>
       </p:sp>
@@ -7943,9 +7903,9 @@
           </p:cNvPicPr>
           <p:nvPr/>
         </p:nvPicPr>
-        <p:blipFill rotWithShape="1">
+        <p:blipFill>
           <a:blip r:embed="rId2"/>
-          <a:srcRect r="25124"/>
+          <a:srcRect l="7456" r="7456"/>
           <a:stretch/>
         </p:blipFill>
         <p:spPr>
@@ -7968,13 +7928,6 @@
   <p:clrMapOvr>
     <a:masterClrMapping/>
   </p:clrMapOvr>
-  <p:timing>
-    <p:tnLst>
-      <p:par>
-        <p:cTn id="1" dur="indefinite" restart="never" nodeType="tmRoot"/>
-      </p:par>
-    </p:tnLst>
-  </p:timing>
 </p:sld>
 </file>
 
@@ -8027,14 +7980,13 @@
         </p:nvPicPr>
         <p:blipFill>
           <a:blip r:embed="rId2"/>
-          <a:stretch>
-            <a:fillRect/>
-          </a:stretch>
+          <a:srcRect/>
+          <a:stretch/>
         </p:blipFill>
         <p:spPr>
           <a:xfrm>
-            <a:off x="2573383" y="2224090"/>
-            <a:ext cx="6608511" cy="4192423"/>
+            <a:off x="2573383" y="2628691"/>
+            <a:ext cx="6608511" cy="3383220"/>
           </a:xfrm>
           <a:prstGeom prst="rect">
             <a:avLst/>
@@ -8051,13 +8003,6 @@
   <p:clrMapOvr>
     <a:masterClrMapping/>
   </p:clrMapOvr>
-  <p:timing>
-    <p:tnLst>
-      <p:par>
-        <p:cTn id="1" dur="indefinite" restart="never" nodeType="tmRoot"/>
-      </p:par>
-    </p:tnLst>
-  </p:timing>
 </p:sld>
 </file>
 
@@ -8094,14 +8039,9 @@
           <a:lstStyle/>
           <a:p>
             <a:r>
-              <a:rPr lang="es-PE" dirty="0" smtClean="0"/>
-              <a:t>FRAME </a:t>
-            </a:r>
-            <a:r>
-              <a:rPr lang="es-PE" dirty="0" smtClean="0"/>
-              <a:t>MANTENIMIENTO PRODUCTO</a:t>
-            </a:r>
-            <a:endParaRPr lang="es-PE" dirty="0"/>
+              <a:rPr lang="es-PE" dirty="0"/>
+              <a:t>FRAME MANTENIMIENTO PRODUCTO</a:t>
+            </a:r>
           </a:p>
         </p:txBody>
       </p:sp>
@@ -8124,37 +8064,8 @@
           <a:p>
             <a:r>
               <a:rPr lang="es-PE" sz="2400" dirty="0"/>
-              <a:t>Enfocado a la gestión de </a:t>
-            </a:r>
-            <a:r>
-              <a:rPr lang="es-PE" sz="2400" dirty="0" smtClean="0"/>
-              <a:t>productos</a:t>
-            </a:r>
-            <a:r>
-              <a:rPr lang="es-PE" sz="2400" dirty="0" smtClean="0"/>
-              <a:t>, </a:t>
-            </a:r>
-            <a:r>
-              <a:rPr lang="es-PE" sz="2400" dirty="0"/>
-              <a:t>en </a:t>
-            </a:r>
-            <a:r>
-              <a:rPr lang="es-PE" sz="2400" dirty="0" smtClean="0"/>
-              <a:t>donde un trabajador o administrador </a:t>
-            </a:r>
-            <a:r>
-              <a:rPr lang="es-PE" sz="2400" dirty="0"/>
-              <a:t>pueda </a:t>
-            </a:r>
-            <a:r>
-              <a:rPr lang="es-PE" sz="2400" dirty="0" smtClean="0"/>
-              <a:t>registrarlo </a:t>
-            </a:r>
-            <a:r>
-              <a:rPr lang="es-PE" sz="2400" dirty="0" smtClean="0"/>
-              <a:t>y listarlo.</a:t>
-            </a:r>
-            <a:endParaRPr lang="es-PE" sz="2400" dirty="0"/>
+              <a:t>Enfocado a la gestión de productos, en donde un trabajador o administrador pueda registrarlo y listarlo.</a:t>
+            </a:r>
           </a:p>
         </p:txBody>
       </p:sp>
@@ -8166,9 +8077,9 @@
           </p:cNvPicPr>
           <p:nvPr/>
         </p:nvPicPr>
-        <p:blipFill rotWithShape="1">
+        <p:blipFill>
           <a:blip r:embed="rId2"/>
-          <a:srcRect r="10479"/>
+          <a:srcRect t="2870" b="2870"/>
           <a:stretch/>
         </p:blipFill>
         <p:spPr>
@@ -8191,14 +8102,13 @@
         </p:nvPicPr>
         <p:blipFill>
           <a:blip r:embed="rId3"/>
-          <a:stretch>
-            <a:fillRect/>
-          </a:stretch>
+          <a:srcRect/>
+          <a:stretch/>
         </p:blipFill>
         <p:spPr>
           <a:xfrm>
-            <a:off x="7213258" y="4040996"/>
-            <a:ext cx="4762847" cy="2693607"/>
+            <a:off x="7213258" y="4185048"/>
+            <a:ext cx="4762847" cy="2405503"/>
           </a:xfrm>
           <a:prstGeom prst="rect">
             <a:avLst/>
@@ -8215,13 +8125,6 @@
   <p:clrMapOvr>
     <a:masterClrMapping/>
   </p:clrMapOvr>
-  <p:timing>
-    <p:tnLst>
-      <p:par>
-        <p:cTn id="1" dur="indefinite" restart="never" nodeType="tmRoot"/>
-      </p:par>
-    </p:tnLst>
-  </p:timing>
 </p:sld>
 </file>
 
@@ -8258,10 +8161,9 @@
           <a:lstStyle/>
           <a:p>
             <a:r>
-              <a:rPr lang="es-PE" dirty="0" smtClean="0"/>
+              <a:rPr lang="es-PE" dirty="0"/>
               <a:t>Vista previa del código</a:t>
             </a:r>
-            <a:endParaRPr lang="es-PE" dirty="0"/>
           </a:p>
         </p:txBody>
       </p:sp>
@@ -8275,14 +8177,13 @@
         </p:nvPicPr>
         <p:blipFill>
           <a:blip r:embed="rId2"/>
-          <a:stretch>
-            <a:fillRect/>
-          </a:stretch>
+          <a:srcRect/>
+          <a:stretch/>
         </p:blipFill>
         <p:spPr>
           <a:xfrm>
-            <a:off x="2055337" y="2277191"/>
-            <a:ext cx="6863828" cy="4277857"/>
+            <a:off x="2055337" y="2659154"/>
+            <a:ext cx="6863828" cy="3513930"/>
           </a:xfrm>
           <a:prstGeom prst="rect">
             <a:avLst/>
@@ -8299,13 +8200,6 @@
   <p:clrMapOvr>
     <a:masterClrMapping/>
   </p:clrMapOvr>
-  <p:timing>
-    <p:tnLst>
-      <p:par>
-        <p:cTn id="1" dur="indefinite" restart="never" nodeType="tmRoot"/>
-      </p:par>
-    </p:tnLst>
-  </p:timing>
 </p:sld>
 </file>
 
@@ -8342,14 +8236,9 @@
           <a:lstStyle/>
           <a:p>
             <a:r>
-              <a:rPr lang="es-PE" dirty="0" smtClean="0"/>
-              <a:t>FRAME </a:t>
-            </a:r>
-            <a:r>
-              <a:rPr lang="es-PE" dirty="0" smtClean="0"/>
-              <a:t>AGREGAR CARRITO</a:t>
-            </a:r>
-            <a:endParaRPr lang="es-PE" dirty="0"/>
+              <a:rPr lang="es-PE" dirty="0"/>
+              <a:t>FRAME AGREGAR CARRITO</a:t>
+            </a:r>
           </a:p>
         </p:txBody>
       </p:sp>
@@ -8372,39 +8261,11 @@
           <a:p>
             <a:r>
               <a:rPr lang="es-PE" sz="2400" dirty="0"/>
-              <a:t>Enfocado </a:t>
-            </a:r>
-            <a:r>
-              <a:rPr lang="es-PE" sz="2400" dirty="0" smtClean="0"/>
-              <a:t>a una transacción, en donde un cliente efectúa una compra de un producto mediante carrito.</a:t>
-            </a:r>
-            <a:endParaRPr lang="es-PE" sz="2400" dirty="0"/>
-          </a:p>
-        </p:txBody>
-      </p:sp>
-      <p:pic>
-        <p:nvPicPr>
-          <p:cNvPr id="6" name="Imagen 5"/>
-          <p:cNvPicPr>
-            <a:picLocks noChangeAspect="1"/>
-          </p:cNvPicPr>
-          <p:nvPr/>
-        </p:nvPicPr>
-        <p:blipFill rotWithShape="1">
-          <a:blip r:embed="rId2"/>
-          <a:srcRect l="-1" r="-39705"/>
-          <a:stretch/>
-        </p:blipFill>
-        <p:spPr>
-          <a:xfrm>
-            <a:off x="4757003" y="2111633"/>
-            <a:ext cx="10112707" cy="2879777"/>
-          </a:xfrm>
-          <a:prstGeom prst="rect">
-            <a:avLst/>
-          </a:prstGeom>
-        </p:spPr>
-      </p:pic>
+              <a:t>Enfocado a una transacción, en donde un cliente efectúa una compra de un producto mediante carrito.</a:t>
+            </a:r>
+          </a:p>
+        </p:txBody>
+      </p:sp>
       <p:pic>
         <p:nvPicPr>
           <p:cNvPr id="5" name="Imagen 4"/>
@@ -8413,14 +8274,43 @@
           </p:cNvPicPr>
           <p:nvPr/>
         </p:nvPicPr>
-        <p:blipFill rotWithShape="1">
-          <a:blip r:embed="rId3"/>
-          <a:srcRect r="33696"/>
+        <p:blipFill>
+          <a:blip r:embed="rId2"/>
+          <a:srcRect t="27683" b="27683"/>
           <a:stretch/>
         </p:blipFill>
         <p:spPr>
           <a:xfrm>
-            <a:off x="6044883" y="3369270"/>
+            <a:off x="6301262" y="1142169"/>
+            <a:ext cx="5556868" cy="2389406"/>
+          </a:xfrm>
+          <a:prstGeom prst="rect">
+            <a:avLst/>
+          </a:prstGeom>
+        </p:spPr>
+      </p:pic>
+      <p:pic>
+        <p:nvPicPr>
+          <p:cNvPr id="7" name="Imagen 6">
+            <a:extLst>
+              <a:ext uri="{FF2B5EF4-FFF2-40B4-BE49-F238E27FC236}">
+                <a16:creationId xmlns:a16="http://schemas.microsoft.com/office/drawing/2014/main" id="{60677A04-3B8E-468A-9986-55DE3C20FEF7}"/>
+              </a:ext>
+            </a:extLst>
+          </p:cNvPr>
+          <p:cNvPicPr>
+            <a:picLocks noChangeAspect="1"/>
+          </p:cNvPicPr>
+          <p:nvPr/>
+        </p:nvPicPr>
+        <p:blipFill>
+          <a:blip r:embed="rId3"/>
+          <a:srcRect t="16971" b="16971"/>
+          <a:stretch/>
+        </p:blipFill>
+        <p:spPr>
+          <a:xfrm>
+            <a:off x="5888433" y="4136530"/>
             <a:ext cx="5969697" cy="2566919"/>
           </a:xfrm>
           <a:prstGeom prst="rect">
@@ -8438,13 +8328,6 @@
   <p:clrMapOvr>
     <a:masterClrMapping/>
   </p:clrMapOvr>
-  <p:timing>
-    <p:tnLst>
-      <p:par>
-        <p:cTn id="1" dur="indefinite" restart="never" nodeType="tmRoot"/>
-      </p:par>
-    </p:tnLst>
-  </p:timing>
 </p:sld>
 </file>
 
@@ -8481,10 +8364,9 @@
           <a:lstStyle/>
           <a:p>
             <a:r>
-              <a:rPr lang="es-PE" dirty="0" smtClean="0"/>
+              <a:rPr lang="es-PE" dirty="0"/>
               <a:t>Vista previa del código</a:t>
             </a:r>
-            <a:endParaRPr lang="es-PE" dirty="0"/>
           </a:p>
         </p:txBody>
       </p:sp>
@@ -8498,14 +8380,13 @@
         </p:nvPicPr>
         <p:blipFill>
           <a:blip r:embed="rId2"/>
-          <a:stretch>
-            <a:fillRect/>
-          </a:stretch>
+          <a:srcRect/>
+          <a:stretch/>
         </p:blipFill>
         <p:spPr>
           <a:xfrm>
-            <a:off x="2606722" y="2301705"/>
-            <a:ext cx="6601606" cy="4024032"/>
+            <a:off x="2606722" y="2623878"/>
+            <a:ext cx="6601606" cy="3379685"/>
           </a:xfrm>
           <a:prstGeom prst="rect">
             <a:avLst/>
@@ -8522,13 +8403,6 @@
   <p:clrMapOvr>
     <a:masterClrMapping/>
   </p:clrMapOvr>
-  <p:timing>
-    <p:tnLst>
-      <p:par>
-        <p:cTn id="1" dur="indefinite" restart="never" nodeType="tmRoot"/>
-      </p:par>
-    </p:tnLst>
-  </p:timing>
 </p:sld>
 </file>
 
@@ -8595,10 +8469,9 @@
           <a:lstStyle/>
           <a:p>
             <a:r>
-              <a:rPr lang="es-PE" dirty="0" smtClean="0"/>
+              <a:rPr lang="es-PE" dirty="0"/>
               <a:t>¿DE QUE TRATA EL PROYECTO?</a:t>
             </a:r>
-            <a:endParaRPr lang="es-PE" dirty="0"/>
           </a:p>
         </p:txBody>
       </p:sp>
@@ -8612,13 +8485,6 @@
   <p:clrMapOvr>
     <a:masterClrMapping/>
   </p:clrMapOvr>
-  <p:timing>
-    <p:tnLst>
-      <p:par>
-        <p:cTn id="1" dur="indefinite" restart="never" nodeType="tmRoot"/>
-      </p:par>
-    </p:tnLst>
-  </p:timing>
 </p:sld>
 </file>
 
@@ -8655,10 +8521,9 @@
           <a:lstStyle/>
           <a:p>
             <a:r>
-              <a:rPr lang="es-PE" dirty="0" smtClean="0"/>
+              <a:rPr lang="es-PE" dirty="0"/>
               <a:t>¿De que trata el proyecto?</a:t>
             </a:r>
-            <a:endParaRPr lang="es-PE" dirty="0"/>
           </a:p>
         </p:txBody>
       </p:sp>
@@ -8681,45 +8546,13 @@
           <a:p>
             <a:r>
               <a:rPr lang="es-ES" sz="1900" dirty="0"/>
-              <a:t>Se implementará un Software para la consulta, </a:t>
-            </a:r>
-            <a:r>
-              <a:rPr lang="es-ES" sz="1900" dirty="0" smtClean="0"/>
-              <a:t>registro y actualización </a:t>
-            </a:r>
+              <a:t>Se implementará un Software para la consulta, registro y actualización de productos, datos de clientes y administradores inferiores, para ventas del rubro tecnológico.</a:t>
+            </a:r>
+          </a:p>
+          <a:p>
             <a:r>
               <a:rPr lang="es-ES" sz="1900" dirty="0"/>
-              <a:t>de </a:t>
-            </a:r>
-            <a:r>
-              <a:rPr lang="es-ES" sz="1900" dirty="0" smtClean="0"/>
-              <a:t>productos, </a:t>
-            </a:r>
-            <a:r>
-              <a:rPr lang="es-ES" sz="1900" dirty="0" smtClean="0"/>
-              <a:t>datos de clientes y administradores inferiores</a:t>
-            </a:r>
-            <a:r>
-              <a:rPr lang="es-ES" sz="1900" dirty="0"/>
-              <a:t>, para </a:t>
-            </a:r>
-            <a:r>
-              <a:rPr lang="es-ES" sz="1900" dirty="0" smtClean="0"/>
-              <a:t>empresas del rubro tecnológico.</a:t>
-            </a:r>
-          </a:p>
-          <a:p>
-            <a:r>
-              <a:rPr lang="es-ES" sz="1900" dirty="0" smtClean="0"/>
-              <a:t>El </a:t>
-            </a:r>
-            <a:r>
-              <a:rPr lang="es-ES" sz="1900" dirty="0"/>
-              <a:t>Software será parte del proceso para la gestión de </a:t>
-            </a:r>
-            <a:r>
-              <a:rPr lang="es-ES" sz="1900" dirty="0" smtClean="0"/>
-              <a:t>inventario y creación de usuarios.</a:t>
+              <a:t>El Software será parte del proceso para la gestión de inventario y creación de usuarios.</a:t>
             </a:r>
             <a:endParaRPr lang="es-PE" sz="1900" dirty="0"/>
           </a:p>
@@ -8735,14 +8568,13 @@
         </p:nvPicPr>
         <p:blipFill>
           <a:blip r:embed="rId2"/>
-          <a:stretch>
-            <a:fillRect/>
-          </a:stretch>
+          <a:srcRect/>
+          <a:stretch/>
         </p:blipFill>
         <p:spPr>
           <a:xfrm>
-            <a:off x="4643861" y="2155184"/>
-            <a:ext cx="4923728" cy="3571466"/>
+            <a:off x="5218688" y="2155184"/>
+            <a:ext cx="3774073" cy="3571466"/>
           </a:xfrm>
           <a:prstGeom prst="rect">
             <a:avLst/>
@@ -8757,15 +8589,15 @@
           </p:cNvPicPr>
           <p:nvPr/>
         </p:nvPicPr>
-        <p:blipFill rotWithShape="1">
+        <p:blipFill>
           <a:blip r:embed="rId3"/>
-          <a:srcRect r="25500"/>
+          <a:srcRect t="10858" b="10858"/>
           <a:stretch/>
         </p:blipFill>
         <p:spPr>
           <a:xfrm>
-            <a:off x="6178906" y="4136530"/>
-            <a:ext cx="5904237" cy="2334423"/>
+            <a:off x="6287763" y="3879669"/>
+            <a:ext cx="5904237" cy="2734976"/>
           </a:xfrm>
           <a:prstGeom prst="rect">
             <a:avLst/>
@@ -8782,13 +8614,6 @@
   <p:clrMapOvr>
     <a:masterClrMapping/>
   </p:clrMapOvr>
-  <p:timing>
-    <p:tnLst>
-      <p:par>
-        <p:cTn id="1" dur="indefinite" restart="never" nodeType="tmRoot"/>
-      </p:par>
-    </p:tnLst>
-  </p:timing>
 </p:sld>
 </file>
 
@@ -8827,10 +8652,9 @@
           <a:lstStyle/>
           <a:p>
             <a:r>
-              <a:rPr lang="es-PE" dirty="0" smtClean="0"/>
+              <a:rPr lang="es-PE" dirty="0"/>
               <a:t>OBJETIVOS DEL PROYECTO</a:t>
             </a:r>
-            <a:endParaRPr lang="es-PE" dirty="0"/>
           </a:p>
         </p:txBody>
       </p:sp>
@@ -8844,13 +8668,6 @@
   <p:clrMapOvr>
     <a:masterClrMapping/>
   </p:clrMapOvr>
-  <p:timing>
-    <p:tnLst>
-      <p:par>
-        <p:cTn id="1" dur="indefinite" restart="never" nodeType="tmRoot"/>
-      </p:par>
-    </p:tnLst>
-  </p:timing>
 </p:sld>
 </file>
 
@@ -8887,10 +8704,9 @@
           <a:lstStyle/>
           <a:p>
             <a:r>
-              <a:rPr lang="es-PE" dirty="0" smtClean="0"/>
+              <a:rPr lang="es-PE" dirty="0"/>
               <a:t>Objetivos</a:t>
             </a:r>
-            <a:endParaRPr lang="es-PE" dirty="0"/>
           </a:p>
         </p:txBody>
       </p:sp>
@@ -8922,11 +8738,7 @@
             </a:r>
             <a:r>
               <a:rPr lang="es-ES_tradnl" dirty="0"/>
-              <a:t>Tener registro completo de los trabajadores pertenecientes a la empresa</a:t>
-            </a:r>
-            <a:r>
-              <a:rPr lang="es-ES_tradnl" dirty="0" smtClean="0"/>
-              <a:t>.</a:t>
+              <a:t>Tener registro completo de los trabajadores pertenecientes a la empresa.</a:t>
             </a:r>
             <a:endParaRPr lang="es-PE" dirty="0"/>
           </a:p>
@@ -8937,11 +8749,7 @@
             </a:r>
             <a:r>
               <a:rPr lang="es-ES_tradnl" dirty="0"/>
-              <a:t>Facilitar el manejo y control del inventario de la empresa</a:t>
-            </a:r>
-            <a:r>
-              <a:rPr lang="es-ES_tradnl" dirty="0" smtClean="0"/>
-              <a:t>.</a:t>
+              <a:t>Facilitar el manejo y control del inventario de la empresa.</a:t>
             </a:r>
             <a:endParaRPr lang="es-PE" dirty="0"/>
           </a:p>
@@ -9019,13 +8827,6 @@
   <p:clrMapOvr>
     <a:masterClrMapping/>
   </p:clrMapOvr>
-  <p:timing>
-    <p:tnLst>
-      <p:par>
-        <p:cTn id="1" dur="indefinite" restart="never" nodeType="tmRoot"/>
-      </p:par>
-    </p:tnLst>
-  </p:timing>
 </p:sld>
 </file>
 
@@ -9064,10 +8865,9 @@
           <a:lstStyle/>
           <a:p>
             <a:r>
-              <a:rPr lang="es-PE" dirty="0" smtClean="0"/>
+              <a:rPr lang="es-PE" dirty="0"/>
               <a:t>DEFINICIÓN Y ALCANCE DEL PROYECTO</a:t>
             </a:r>
-            <a:endParaRPr lang="es-PE" dirty="0"/>
           </a:p>
         </p:txBody>
       </p:sp>
@@ -9081,13 +8881,6 @@
   <p:clrMapOvr>
     <a:masterClrMapping/>
   </p:clrMapOvr>
-  <p:timing>
-    <p:tnLst>
-      <p:par>
-        <p:cTn id="1" dur="indefinite" restart="never" nodeType="tmRoot"/>
-      </p:par>
-    </p:tnLst>
-  </p:timing>
 </p:sld>
 </file>
 
@@ -9124,10 +8917,9 @@
           <a:lstStyle/>
           <a:p>
             <a:r>
-              <a:rPr lang="es-PE" dirty="0" smtClean="0"/>
+              <a:rPr lang="es-PE" dirty="0"/>
               <a:t>Definición y Alcance</a:t>
             </a:r>
-            <a:endParaRPr lang="es-PE" dirty="0"/>
           </a:p>
         </p:txBody>
       </p:sp>
@@ -9155,25 +8947,17 @@
           <a:p>
             <a:r>
               <a:rPr lang="es-ES_tradnl" dirty="0"/>
-              <a:t>El proceso inicia cuando la empresa interesada se comunica con el distribuidor de software/aplicaciones, para la implementación de dicha herramienta en el </a:t>
-            </a:r>
-            <a:r>
-              <a:rPr lang="es-ES_tradnl" dirty="0" smtClean="0"/>
-              <a:t>negocio.</a:t>
+              <a:t>El proceso inicia cuando la empresa interesada se comunica con el distribuidor de software/aplicaciones, para la implementación de dicha herramienta en el negocio.</a:t>
             </a:r>
             <a:br>
-              <a:rPr lang="es-ES_tradnl" dirty="0" smtClean="0"/>
+              <a:rPr lang="es-ES_tradnl" dirty="0"/>
             </a:br>
-            <a:endParaRPr lang="es-ES_tradnl" dirty="0" smtClean="0"/>
-          </a:p>
-          <a:p>
-            <a:r>
-              <a:rPr lang="es-ES_tradnl" dirty="0" smtClean="0"/>
-              <a:t>El </a:t>
-            </a:r>
+            <a:endParaRPr lang="es-ES_tradnl" dirty="0"/>
+          </a:p>
+          <a:p>
             <a:r>
               <a:rPr lang="es-ES_tradnl" dirty="0"/>
-              <a:t>distribuidor le responde al representante de la empresa, enviando las indicaciones para su uso y los reglamentos.</a:t>
+              <a:t>El distribuidor le responde al representante de la empresa, enviando las indicaciones para su uso y los reglamentos.</a:t>
             </a:r>
             <a:endParaRPr lang="es-PE" dirty="0"/>
           </a:p>
@@ -9189,9 +8973,8 @@
         </p:nvPicPr>
         <p:blipFill>
           <a:blip r:embed="rId2"/>
-          <a:stretch>
-            <a:fillRect/>
-          </a:stretch>
+          <a:srcRect l="6811" r="6811"/>
+          <a:stretch/>
         </p:blipFill>
         <p:spPr>
           <a:xfrm>
@@ -9226,13 +9009,6 @@
   <p:clrMapOvr>
     <a:masterClrMapping/>
   </p:clrMapOvr>
-  <p:timing>
-    <p:tnLst>
-      <p:par>
-        <p:cTn id="1" dur="indefinite" restart="never" nodeType="tmRoot"/>
-      </p:par>
-    </p:tnLst>
-  </p:timing>
 </p:sld>
 </file>
 
@@ -9271,10 +9047,9 @@
           <a:lstStyle/>
           <a:p>
             <a:r>
-              <a:rPr lang="es-PE" dirty="0" smtClean="0"/>
+              <a:rPr lang="es-PE" dirty="0"/>
               <a:t>ELEMENTOS DEL PROYECTO</a:t>
             </a:r>
-            <a:endParaRPr lang="es-PE" dirty="0"/>
           </a:p>
         </p:txBody>
       </p:sp>
@@ -9288,19 +9063,47 @@
   <p:clrMapOvr>
     <a:masterClrMapping/>
   </p:clrMapOvr>
-  <p:timing>
-    <p:tnLst>
-      <p:par>
-        <p:cTn id="1" dur="indefinite" restart="never" nodeType="tmRoot"/>
-      </p:par>
-    </p:tnLst>
-  </p:timing>
 </p:sld>
 </file>
 
 <file path=ppt/slides/slide9.xml><?xml version="1.0" encoding="utf-8"?>
 <p:sld xmlns:a="http://schemas.openxmlformats.org/drawingml/2006/main" xmlns:r="http://schemas.openxmlformats.org/officeDocument/2006/relationships" xmlns:p="http://schemas.openxmlformats.org/presentationml/2006/main">
   <p:cSld>
+    <p:bg>
+      <p:bgPr>
+        <a:gradFill rotWithShape="1">
+          <a:gsLst>
+            <a:gs pos="0">
+              <a:schemeClr val="bg2">
+                <a:tint val="96000"/>
+                <a:shade val="100000"/>
+                <a:hueMod val="270000"/>
+                <a:satMod val="200000"/>
+                <a:lumMod val="128000"/>
+              </a:schemeClr>
+            </a:gs>
+            <a:gs pos="50000">
+              <a:schemeClr val="bg2">
+                <a:shade val="100000"/>
+                <a:hueMod val="100000"/>
+                <a:satMod val="110000"/>
+                <a:lumMod val="130000"/>
+              </a:schemeClr>
+            </a:gs>
+            <a:gs pos="100000">
+              <a:schemeClr val="bg2">
+                <a:shade val="78000"/>
+                <a:hueMod val="44000"/>
+                <a:satMod val="200000"/>
+                <a:lumMod val="69000"/>
+              </a:schemeClr>
+            </a:gs>
+          </a:gsLst>
+          <a:lin ang="2520000" scaled="0"/>
+        </a:gradFill>
+        <a:effectLst/>
+      </p:bgPr>
+    </p:bg>
     <p:spTree>
       <p:nvGrpSpPr>
         <p:cNvPr id="1" name=""/>
@@ -9315,6 +9118,479 @@
           <a:chExt cx="0" cy="0"/>
         </a:xfrm>
       </p:grpSpPr>
+      <p:pic>
+        <p:nvPicPr>
+          <p:cNvPr id="11" name="Picture 10">
+            <a:extLst>
+              <a:ext uri="{FF2B5EF4-FFF2-40B4-BE49-F238E27FC236}">
+                <a16:creationId xmlns:a16="http://schemas.microsoft.com/office/drawing/2014/main" id="{01A3CA1B-1530-4046-A299-90F41FE7FBFA}"/>
+              </a:ext>
+              <a:ext uri="{C183D7F6-B498-43B3-948B-1728B52AA6E4}">
+                <adec:decorative xmlns:adec="http://schemas.microsoft.com/office/drawing/2017/decorative" val="1"/>
+              </a:ext>
+            </a:extLst>
+          </p:cNvPr>
+          <p:cNvPicPr>
+            <a:picLocks noGrp="1" noRot="1" noChangeAspect="1" noMove="1" noResize="1" noEditPoints="1" noAdjustHandles="1" noChangeArrowheads="1" noChangeShapeType="1" noCrop="1"/>
+          </p:cNvPicPr>
+          <p:nvPr>
+            <p:extLst>
+              <p:ext uri="{386F3935-93C4-4BCD-93E2-E3B085C9AB24}">
+                <p16:designElem xmlns:p16="http://schemas.microsoft.com/office/powerpoint/2015/main" val="1"/>
+              </p:ext>
+            </p:extLst>
+          </p:nvPr>
+        </p:nvPicPr>
+        <p:blipFill>
+          <a:blip r:embed="rId2">
+            <a:alphaModFix amt="10000"/>
+            <a:extLst>
+              <a:ext uri="{28A0092B-C50C-407E-A947-70E740481C1C}">
+                <a14:useLocalDpi xmlns:a14="http://schemas.microsoft.com/office/drawing/2010/main" val="0"/>
+              </a:ext>
+            </a:extLst>
+          </a:blip>
+          <a:stretch>
+            <a:fillRect/>
+          </a:stretch>
+        </p:blipFill>
+        <p:spPr>
+          <a:xfrm>
+            <a:off x="0" y="0"/>
+            <a:ext cx="12192000" cy="6858000"/>
+          </a:xfrm>
+          <a:prstGeom prst="rect">
+            <a:avLst/>
+          </a:prstGeom>
+        </p:spPr>
+      </p:pic>
+      <p:pic>
+        <p:nvPicPr>
+          <p:cNvPr id="13" name="Picture 12">
+            <a:extLst>
+              <a:ext uri="{FF2B5EF4-FFF2-40B4-BE49-F238E27FC236}">
+                <a16:creationId xmlns:a16="http://schemas.microsoft.com/office/drawing/2014/main" id="{126A6064-3EEB-4D82-B8AB-85EC8287EF25}"/>
+              </a:ext>
+              <a:ext uri="{C183D7F6-B498-43B3-948B-1728B52AA6E4}">
+                <adec:decorative xmlns:adec="http://schemas.microsoft.com/office/drawing/2017/decorative" val="1"/>
+              </a:ext>
+            </a:extLst>
+          </p:cNvPr>
+          <p:cNvPicPr>
+            <a:picLocks noGrp="1" noRot="1" noChangeAspect="1" noMove="1" noResize="1" noEditPoints="1" noAdjustHandles="1" noChangeArrowheads="1" noChangeShapeType="1" noCrop="1"/>
+          </p:cNvPicPr>
+          <p:nvPr>
+            <p:extLst>
+              <p:ext uri="{386F3935-93C4-4BCD-93E2-E3B085C9AB24}">
+                <p16:designElem xmlns:p16="http://schemas.microsoft.com/office/powerpoint/2015/main" val="1"/>
+              </p:ext>
+            </p:extLst>
+          </p:nvPr>
+        </p:nvPicPr>
+        <p:blipFill>
+          <a:blip r:embed="rId3">
+            <a:extLst>
+              <a:ext uri="{28A0092B-C50C-407E-A947-70E740481C1C}">
+                <a14:useLocalDpi xmlns:a14="http://schemas.microsoft.com/office/drawing/2010/main" val="0"/>
+              </a:ext>
+            </a:extLst>
+          </a:blip>
+          <a:stretch>
+            <a:fillRect/>
+          </a:stretch>
+        </p:blipFill>
+        <p:spPr>
+          <a:xfrm>
+            <a:off x="1" y="1970240"/>
+            <a:ext cx="10437812" cy="321164"/>
+          </a:xfrm>
+          <a:prstGeom prst="rect">
+            <a:avLst/>
+          </a:prstGeom>
+        </p:spPr>
+      </p:pic>
+      <p:pic>
+        <p:nvPicPr>
+          <p:cNvPr id="15" name="Picture 14">
+            <a:extLst>
+              <a:ext uri="{FF2B5EF4-FFF2-40B4-BE49-F238E27FC236}">
+                <a16:creationId xmlns:a16="http://schemas.microsoft.com/office/drawing/2014/main" id="{70EB3F8A-0655-4D47-B546-F7EC731E02CF}"/>
+              </a:ext>
+              <a:ext uri="{C183D7F6-B498-43B3-948B-1728B52AA6E4}">
+                <adec:decorative xmlns:adec="http://schemas.microsoft.com/office/drawing/2017/decorative" val="1"/>
+              </a:ext>
+            </a:extLst>
+          </p:cNvPr>
+          <p:cNvPicPr>
+            <a:picLocks noGrp="1" noRot="1" noChangeAspect="1" noMove="1" noResize="1" noEditPoints="1" noAdjustHandles="1" noChangeArrowheads="1" noChangeShapeType="1" noCrop="1"/>
+          </p:cNvPicPr>
+          <p:nvPr>
+            <p:extLst>
+              <p:ext uri="{386F3935-93C4-4BCD-93E2-E3B085C9AB24}">
+                <p16:designElem xmlns:p16="http://schemas.microsoft.com/office/powerpoint/2015/main" val="1"/>
+              </p:ext>
+            </p:extLst>
+          </p:nvPr>
+        </p:nvPicPr>
+        <p:blipFill>
+          <a:blip r:embed="rId4" cstate="print">
+            <a:extLst>
+              <a:ext uri="{28A0092B-C50C-407E-A947-70E740481C1C}">
+                <a14:useLocalDpi xmlns:a14="http://schemas.microsoft.com/office/drawing/2010/main" val="0"/>
+              </a:ext>
+            </a:extLst>
+          </a:blip>
+          <a:stretch>
+            <a:fillRect/>
+          </a:stretch>
+        </p:blipFill>
+        <p:spPr>
+          <a:xfrm>
+            <a:off x="10585826" y="1971234"/>
+            <a:ext cx="1602997" cy="144270"/>
+          </a:xfrm>
+          <a:prstGeom prst="rect">
+            <a:avLst/>
+          </a:prstGeom>
+        </p:spPr>
+      </p:pic>
+      <p:sp>
+        <p:nvSpPr>
+          <p:cNvPr id="17" name="Rectangle 16">
+            <a:extLst>
+              <a:ext uri="{FF2B5EF4-FFF2-40B4-BE49-F238E27FC236}">
+                <a16:creationId xmlns:a16="http://schemas.microsoft.com/office/drawing/2014/main" id="{FC563705-9678-4052-A909-B5114B9A20BD}"/>
+              </a:ext>
+              <a:ext uri="{C183D7F6-B498-43B3-948B-1728B52AA6E4}">
+                <adec:decorative xmlns:adec="http://schemas.microsoft.com/office/drawing/2017/decorative" val="1"/>
+              </a:ext>
+            </a:extLst>
+          </p:cNvPr>
+          <p:cNvSpPr>
+            <a:spLocks noGrp="1" noRot="1" noChangeAspect="1" noMove="1" noResize="1" noEditPoints="1" noAdjustHandles="1" noChangeArrowheads="1" noChangeShapeType="1" noTextEdit="1"/>
+          </p:cNvSpPr>
+          <p:nvPr>
+            <p:extLst>
+              <p:ext uri="{386F3935-93C4-4BCD-93E2-E3B085C9AB24}">
+                <p16:designElem xmlns:p16="http://schemas.microsoft.com/office/powerpoint/2015/main" val="1"/>
+              </p:ext>
+            </p:extLst>
+          </p:nvPr>
+        </p:nvSpPr>
+        <p:spPr>
+          <a:xfrm>
+            <a:off x="0" y="609600"/>
+            <a:ext cx="10437812" cy="1368198"/>
+          </a:xfrm>
+          <a:prstGeom prst="rect">
+            <a:avLst/>
+          </a:prstGeom>
+          <a:solidFill>
+            <a:schemeClr val="bg1">
+              <a:lumMod val="85000"/>
+              <a:lumOff val="15000"/>
+            </a:schemeClr>
+          </a:solidFill>
+          <a:ln>
+            <a:noFill/>
+          </a:ln>
+        </p:spPr>
+        <p:style>
+          <a:lnRef idx="2">
+            <a:schemeClr val="accent1">
+              <a:shade val="50000"/>
+            </a:schemeClr>
+          </a:lnRef>
+          <a:fillRef idx="1">
+            <a:schemeClr val="accent1"/>
+          </a:fillRef>
+          <a:effectRef idx="0">
+            <a:schemeClr val="accent1"/>
+          </a:effectRef>
+          <a:fontRef idx="minor">
+            <a:schemeClr val="lt1"/>
+          </a:fontRef>
+        </p:style>
+      </p:sp>
+      <p:sp>
+        <p:nvSpPr>
+          <p:cNvPr id="19" name="Rectangle 18">
+            <a:extLst>
+              <a:ext uri="{FF2B5EF4-FFF2-40B4-BE49-F238E27FC236}">
+                <a16:creationId xmlns:a16="http://schemas.microsoft.com/office/drawing/2014/main" id="{22FEEF27-DE57-43BD-AD75-1F367403B6D4}"/>
+              </a:ext>
+              <a:ext uri="{C183D7F6-B498-43B3-948B-1728B52AA6E4}">
+                <adec:decorative xmlns:adec="http://schemas.microsoft.com/office/drawing/2017/decorative" val="1"/>
+              </a:ext>
+            </a:extLst>
+          </p:cNvPr>
+          <p:cNvSpPr>
+            <a:spLocks noGrp="1" noRot="1" noChangeAspect="1" noMove="1" noResize="1" noEditPoints="1" noAdjustHandles="1" noChangeArrowheads="1" noChangeShapeType="1" noTextEdit="1"/>
+          </p:cNvSpPr>
+          <p:nvPr>
+            <p:extLst>
+              <p:ext uri="{386F3935-93C4-4BCD-93E2-E3B085C9AB24}">
+                <p16:designElem xmlns:p16="http://schemas.microsoft.com/office/powerpoint/2015/main" val="1"/>
+              </p:ext>
+            </p:extLst>
+          </p:nvPr>
+        </p:nvSpPr>
+        <p:spPr>
+          <a:xfrm>
+            <a:off x="10585827" y="609600"/>
+            <a:ext cx="1602997" cy="1368198"/>
+          </a:xfrm>
+          <a:prstGeom prst="rect">
+            <a:avLst/>
+          </a:prstGeom>
+          <a:solidFill>
+            <a:schemeClr val="accent1"/>
+          </a:solidFill>
+          <a:ln>
+            <a:noFill/>
+          </a:ln>
+        </p:spPr>
+        <p:style>
+          <a:lnRef idx="2">
+            <a:schemeClr val="accent1">
+              <a:shade val="50000"/>
+            </a:schemeClr>
+          </a:lnRef>
+          <a:fillRef idx="1">
+            <a:schemeClr val="accent1"/>
+          </a:fillRef>
+          <a:effectRef idx="0">
+            <a:schemeClr val="accent1"/>
+          </a:effectRef>
+          <a:fontRef idx="minor">
+            <a:schemeClr val="lt1"/>
+          </a:fontRef>
+        </p:style>
+      </p:sp>
+      <p:sp useBgFill="1">
+        <p:nvSpPr>
+          <p:cNvPr id="21" name="Rectangle 20">
+            <a:extLst>
+              <a:ext uri="{FF2B5EF4-FFF2-40B4-BE49-F238E27FC236}">
+                <a16:creationId xmlns:a16="http://schemas.microsoft.com/office/drawing/2014/main" id="{1DB53884-7D49-4D06-ADC1-1F12BE4DC31B}"/>
+              </a:ext>
+              <a:ext uri="{C183D7F6-B498-43B3-948B-1728B52AA6E4}">
+                <adec:decorative xmlns:adec="http://schemas.microsoft.com/office/drawing/2017/decorative" val="1"/>
+              </a:ext>
+            </a:extLst>
+          </p:cNvPr>
+          <p:cNvSpPr>
+            <a:spLocks noGrp="1" noRot="1" noChangeAspect="1" noMove="1" noResize="1" noEditPoints="1" noAdjustHandles="1" noChangeArrowheads="1" noChangeShapeType="1" noTextEdit="1"/>
+          </p:cNvSpPr>
+          <p:nvPr>
+            <p:extLst>
+              <p:ext uri="{386F3935-93C4-4BCD-93E2-E3B085C9AB24}">
+                <p16:designElem xmlns:p16="http://schemas.microsoft.com/office/powerpoint/2015/main" val="1"/>
+              </p:ext>
+            </p:extLst>
+          </p:nvPr>
+        </p:nvSpPr>
+        <p:spPr>
+          <a:xfrm>
+            <a:off x="0" y="-1"/>
+            <a:ext cx="12188824" cy="6858001"/>
+          </a:xfrm>
+          <a:prstGeom prst="rect">
+            <a:avLst/>
+          </a:prstGeom>
+          <a:ln>
+            <a:noFill/>
+          </a:ln>
+        </p:spPr>
+        <p:style>
+          <a:lnRef idx="2">
+            <a:schemeClr val="accent1">
+              <a:shade val="50000"/>
+            </a:schemeClr>
+          </a:lnRef>
+          <a:fillRef idx="1">
+            <a:schemeClr val="accent1"/>
+          </a:fillRef>
+          <a:effectRef idx="0">
+            <a:schemeClr val="accent1"/>
+          </a:effectRef>
+          <a:fontRef idx="minor">
+            <a:schemeClr val="lt1"/>
+          </a:fontRef>
+        </p:style>
+        <p:txBody>
+          <a:bodyPr rtlCol="0" anchor="ctr"/>
+          <a:lstStyle/>
+          <a:p>
+            <a:pPr algn="ctr"/>
+            <a:endParaRPr lang="en-US"/>
+          </a:p>
+        </p:txBody>
+      </p:sp>
+      <p:pic>
+        <p:nvPicPr>
+          <p:cNvPr id="23" name="Picture 22">
+            <a:extLst>
+              <a:ext uri="{FF2B5EF4-FFF2-40B4-BE49-F238E27FC236}">
+                <a16:creationId xmlns:a16="http://schemas.microsoft.com/office/drawing/2014/main" id="{3182E5E9-DE42-4120-922C-1321AC9A5CDD}"/>
+              </a:ext>
+              <a:ext uri="{C183D7F6-B498-43B3-948B-1728B52AA6E4}">
+                <adec:decorative xmlns:adec="http://schemas.microsoft.com/office/drawing/2017/decorative" val="1"/>
+              </a:ext>
+            </a:extLst>
+          </p:cNvPr>
+          <p:cNvPicPr>
+            <a:picLocks noGrp="1" noRot="1" noChangeAspect="1" noMove="1" noResize="1" noEditPoints="1" noAdjustHandles="1" noChangeArrowheads="1" noChangeShapeType="1" noCrop="1"/>
+          </p:cNvPicPr>
+          <p:nvPr>
+            <p:extLst>
+              <p:ext uri="{386F3935-93C4-4BCD-93E2-E3B085C9AB24}">
+                <p16:designElem xmlns:p16="http://schemas.microsoft.com/office/powerpoint/2015/main" val="1"/>
+              </p:ext>
+            </p:extLst>
+          </p:nvPr>
+        </p:nvPicPr>
+        <p:blipFill>
+          <a:blip r:embed="rId2">
+            <a:alphaModFix amt="10000"/>
+            <a:extLst>
+              <a:ext uri="{28A0092B-C50C-407E-A947-70E740481C1C}">
+                <a14:useLocalDpi xmlns:a14="http://schemas.microsoft.com/office/drawing/2010/main" val="0"/>
+              </a:ext>
+            </a:extLst>
+          </a:blip>
+          <a:stretch>
+            <a:fillRect/>
+          </a:stretch>
+        </p:blipFill>
+        <p:spPr>
+          <a:xfrm>
+            <a:off x="-3176" y="0"/>
+            <a:ext cx="12192000" cy="6858000"/>
+          </a:xfrm>
+          <a:prstGeom prst="rect">
+            <a:avLst/>
+          </a:prstGeom>
+        </p:spPr>
+      </p:pic>
+      <p:sp>
+        <p:nvSpPr>
+          <p:cNvPr id="25" name="Rectangle 24">
+            <a:extLst>
+              <a:ext uri="{FF2B5EF4-FFF2-40B4-BE49-F238E27FC236}">
+                <a16:creationId xmlns:a16="http://schemas.microsoft.com/office/drawing/2014/main" id="{329BD449-87FC-473A-A2A2-BEE0C9A35CF9}"/>
+              </a:ext>
+              <a:ext uri="{C183D7F6-B498-43B3-948B-1728B52AA6E4}">
+                <adec:decorative xmlns:adec="http://schemas.microsoft.com/office/drawing/2017/decorative" val="1"/>
+              </a:ext>
+            </a:extLst>
+          </p:cNvPr>
+          <p:cNvSpPr>
+            <a:spLocks noGrp="1" noRot="1" noChangeAspect="1" noMove="1" noResize="1" noEditPoints="1" noAdjustHandles="1" noChangeArrowheads="1" noChangeShapeType="1" noTextEdit="1"/>
+          </p:cNvSpPr>
+          <p:nvPr>
+            <p:extLst>
+              <p:ext uri="{386F3935-93C4-4BCD-93E2-E3B085C9AB24}">
+                <p16:designElem xmlns:p16="http://schemas.microsoft.com/office/powerpoint/2015/main" val="1"/>
+              </p:ext>
+            </p:extLst>
+          </p:nvPr>
+        </p:nvSpPr>
+        <p:spPr>
+          <a:xfrm>
+            <a:off x="7598325" y="0"/>
+            <a:ext cx="4636008" cy="6858001"/>
+          </a:xfrm>
+          <a:prstGeom prst="rect">
+            <a:avLst/>
+          </a:prstGeom>
+          <a:ln>
+            <a:noFill/>
+          </a:ln>
+        </p:spPr>
+        <p:style>
+          <a:lnRef idx="2">
+            <a:schemeClr val="accent1">
+              <a:shade val="50000"/>
+            </a:schemeClr>
+          </a:lnRef>
+          <a:fillRef idx="1">
+            <a:schemeClr val="accent1"/>
+          </a:fillRef>
+          <a:effectRef idx="0">
+            <a:schemeClr val="accent1"/>
+          </a:effectRef>
+          <a:fontRef idx="minor">
+            <a:schemeClr val="lt1"/>
+          </a:fontRef>
+        </p:style>
+        <p:txBody>
+          <a:bodyPr rtlCol="0" anchor="ctr"/>
+          <a:lstStyle/>
+          <a:p>
+            <a:pPr algn="ctr"/>
+            <a:endParaRPr lang="en-US"/>
+          </a:p>
+        </p:txBody>
+      </p:sp>
+      <p:sp>
+        <p:nvSpPr>
+          <p:cNvPr id="27" name="Rectangle 26">
+            <a:extLst>
+              <a:ext uri="{FF2B5EF4-FFF2-40B4-BE49-F238E27FC236}">
+                <a16:creationId xmlns:a16="http://schemas.microsoft.com/office/drawing/2014/main" id="{F1FFDFE1-ACF2-4AFB-AB5B-547DC1994596}"/>
+              </a:ext>
+              <a:ext uri="{C183D7F6-B498-43B3-948B-1728B52AA6E4}">
+                <adec:decorative xmlns:adec="http://schemas.microsoft.com/office/drawing/2017/decorative" val="1"/>
+              </a:ext>
+            </a:extLst>
+          </p:cNvPr>
+          <p:cNvSpPr>
+            <a:spLocks noGrp="1" noRot="1" noChangeAspect="1" noMove="1" noResize="1" noEditPoints="1" noAdjustHandles="1" noChangeArrowheads="1" noChangeShapeType="1" noTextEdit="1"/>
+          </p:cNvSpPr>
+          <p:nvPr>
+            <p:extLst>
+              <p:ext uri="{386F3935-93C4-4BCD-93E2-E3B085C9AB24}">
+                <p16:designElem xmlns:p16="http://schemas.microsoft.com/office/powerpoint/2015/main" val="1"/>
+              </p:ext>
+            </p:extLst>
+          </p:nvPr>
+        </p:nvSpPr>
+        <p:spPr bwMode="grayWhite">
+          <a:xfrm>
+            <a:off x="2" y="609600"/>
+            <a:ext cx="7876030" cy="1368198"/>
+          </a:xfrm>
+          <a:prstGeom prst="rect">
+            <a:avLst/>
+          </a:prstGeom>
+          <a:solidFill>
+            <a:schemeClr val="bg1">
+              <a:lumMod val="85000"/>
+              <a:lumOff val="15000"/>
+            </a:schemeClr>
+          </a:solidFill>
+          <a:ln>
+            <a:noFill/>
+          </a:ln>
+        </p:spPr>
+        <p:style>
+          <a:lnRef idx="2">
+            <a:schemeClr val="accent1">
+              <a:shade val="50000"/>
+            </a:schemeClr>
+          </a:lnRef>
+          <a:fillRef idx="1">
+            <a:schemeClr val="accent1"/>
+          </a:fillRef>
+          <a:effectRef idx="0">
+            <a:schemeClr val="accent1"/>
+          </a:effectRef>
+          <a:fontRef idx="minor">
+            <a:schemeClr val="lt1"/>
+          </a:fontRef>
+        </p:style>
+      </p:sp>
       <p:sp>
         <p:nvSpPr>
           <p:cNvPr id="2" name="Título 1"/>
@@ -9325,41 +9601,170 @@
             <p:ph type="title"/>
           </p:nvPr>
         </p:nvSpPr>
-        <p:spPr/>
-        <p:txBody>
-          <a:bodyPr/>
-          <a:lstStyle/>
-          <a:p>
-            <a:r>
-              <a:rPr lang="es-PE" dirty="0" smtClean="0"/>
-              <a:t>FRAME ACCESO AL SISTEMA</a:t>
-            </a:r>
-            <a:endParaRPr lang="es-PE" dirty="0"/>
-          </a:p>
-        </p:txBody>
-      </p:sp>
-      <p:sp>
-        <p:nvSpPr>
-          <p:cNvPr id="4" name="Marcador de texto 3"/>
-          <p:cNvSpPr>
-            <a:spLocks noGrp="1"/>
-          </p:cNvSpPr>
-          <p:nvPr>
-            <p:ph type="body" sz="half" idx="2"/>
-          </p:nvPr>
-        </p:nvSpPr>
-        <p:spPr/>
-        <p:txBody>
-          <a:bodyPr>
+        <p:spPr>
+          <a:xfrm>
+            <a:off x="680321" y="753228"/>
+            <a:ext cx="7087552" cy="1080938"/>
+          </a:xfrm>
+        </p:spPr>
+        <p:txBody>
+          <a:bodyPr vert="horz" lIns="91440" tIns="45720" rIns="91440" bIns="45720" rtlCol="0" anchor="ctr">
             <a:normAutofit/>
           </a:bodyPr>
           <a:lstStyle/>
           <a:p>
             <a:r>
-              <a:rPr lang="es-PE" sz="2400" dirty="0" smtClean="0"/>
+              <a:rPr lang="en-US"/>
+              <a:t>FRAME ACCESO AL SISTEMA</a:t>
+            </a:r>
+          </a:p>
+        </p:txBody>
+      </p:sp>
+      <p:pic>
+        <p:nvPicPr>
+          <p:cNvPr id="29" name="Picture 28">
+            <a:extLst>
+              <a:ext uri="{FF2B5EF4-FFF2-40B4-BE49-F238E27FC236}">
+                <a16:creationId xmlns:a16="http://schemas.microsoft.com/office/drawing/2014/main" id="{8B2AD4DD-502F-4AF2-AFAF-580E7CC4BDCE}"/>
+              </a:ext>
+              <a:ext uri="{C183D7F6-B498-43B3-948B-1728B52AA6E4}">
+                <adec:decorative xmlns:adec="http://schemas.microsoft.com/office/drawing/2017/decorative" val="1"/>
+              </a:ext>
+            </a:extLst>
+          </p:cNvPr>
+          <p:cNvPicPr>
+            <a:picLocks noGrp="1" noRot="1" noChangeAspect="1" noMove="1" noResize="1" noEditPoints="1" noAdjustHandles="1" noChangeArrowheads="1" noChangeShapeType="1" noCrop="1"/>
+          </p:cNvPicPr>
+          <p:nvPr>
+            <p:extLst>
+              <p:ext uri="{386F3935-93C4-4BCD-93E2-E3B085C9AB24}">
+                <p16:designElem xmlns:p16="http://schemas.microsoft.com/office/powerpoint/2015/main" val="1"/>
+              </p:ext>
+            </p:extLst>
+          </p:nvPr>
+        </p:nvPicPr>
+        <p:blipFill>
+          <a:blip r:embed="rId3">
+            <a:extLst>
+              <a:ext uri="{28A0092B-C50C-407E-A947-70E740481C1C}">
+                <a14:useLocalDpi xmlns:a14="http://schemas.microsoft.com/office/drawing/2010/main" val="0"/>
+              </a:ext>
+            </a:extLst>
+          </a:blip>
+          <a:stretch>
+            <a:fillRect/>
+          </a:stretch>
+        </p:blipFill>
+        <p:spPr>
+          <a:xfrm>
+            <a:off x="2" y="1970240"/>
+            <a:ext cx="7967048" cy="321164"/>
+          </a:xfrm>
+          <a:prstGeom prst="rect">
+            <a:avLst/>
+          </a:prstGeom>
+        </p:spPr>
+      </p:pic>
+      <p:sp>
+        <p:nvSpPr>
+          <p:cNvPr id="4" name="Marcador de texto 3"/>
+          <p:cNvSpPr>
+            <a:spLocks noGrp="1"/>
+          </p:cNvSpPr>
+          <p:nvPr>
+            <p:ph type="body" sz="half" idx="2"/>
+          </p:nvPr>
+        </p:nvSpPr>
+        <p:spPr>
+          <a:xfrm>
+            <a:off x="680321" y="2336873"/>
+            <a:ext cx="6423211" cy="3599316"/>
+          </a:xfrm>
+        </p:spPr>
+        <p:txBody>
+          <a:bodyPr vert="horz" lIns="91440" tIns="45720" rIns="91440" bIns="45720" rtlCol="0">
+            <a:normAutofit/>
+          </a:bodyPr>
+          <a:lstStyle/>
+          <a:p>
+            <a:pPr indent="-228600">
+              <a:buFont typeface="Arial" panose="020B0604020202020204" pitchFamily="34" charset="0"/>
+              <a:buChar char="•"/>
+            </a:pPr>
+            <a:r>
+              <a:rPr lang="en-US" sz="2000"/>
               <a:t>Frame principal en dónde se tendrá que ingresar un usuario y contraseña correspondiente para poder acceder y administrar el sistema de gestión</a:t>
             </a:r>
-            <a:endParaRPr lang="es-PE" sz="2400" dirty="0"/>
+          </a:p>
+        </p:txBody>
+      </p:sp>
+      <p:sp>
+        <p:nvSpPr>
+          <p:cNvPr id="31" name="Rectangle 30">
+            <a:extLst>
+              <a:ext uri="{FF2B5EF4-FFF2-40B4-BE49-F238E27FC236}">
+                <a16:creationId xmlns:a16="http://schemas.microsoft.com/office/drawing/2014/main" id="{79BB2C37-0554-4926-9BC6-636E0CA1AFAA}"/>
+              </a:ext>
+              <a:ext uri="{C183D7F6-B498-43B3-948B-1728B52AA6E4}">
+                <adec:decorative xmlns:adec="http://schemas.microsoft.com/office/drawing/2017/decorative" val="1"/>
+              </a:ext>
+            </a:extLst>
+          </p:cNvPr>
+          <p:cNvSpPr>
+            <a:spLocks noGrp="1" noRot="1" noChangeAspect="1" noMove="1" noResize="1" noEditPoints="1" noAdjustHandles="1" noChangeArrowheads="1" noChangeShapeType="1" noTextEdit="1"/>
+          </p:cNvSpPr>
+          <p:nvPr>
+            <p:extLst>
+              <p:ext uri="{386F3935-93C4-4BCD-93E2-E3B085C9AB24}">
+                <p16:designElem xmlns:p16="http://schemas.microsoft.com/office/powerpoint/2015/main" val="1"/>
+              </p:ext>
+            </p:extLst>
+          </p:nvPr>
+        </p:nvSpPr>
+        <p:spPr>
+          <a:xfrm>
+            <a:off x="8246423" y="642795"/>
+            <a:ext cx="3347830" cy="5575125"/>
+          </a:xfrm>
+          <a:prstGeom prst="rect">
+            <a:avLst/>
+          </a:prstGeom>
+          <a:solidFill>
+            <a:schemeClr val="tx1"/>
+          </a:solidFill>
+          <a:ln>
+            <a:noFill/>
+          </a:ln>
+          <a:effectLst>
+            <a:outerShdw blurRad="76200" dist="63500" dir="5040000" algn="t" rotWithShape="0">
+              <a:prstClr val="black">
+                <a:alpha val="41000"/>
+              </a:prstClr>
+            </a:outerShdw>
+          </a:effectLst>
+        </p:spPr>
+        <p:style>
+          <a:lnRef idx="2">
+            <a:schemeClr val="accent1">
+              <a:shade val="50000"/>
+            </a:schemeClr>
+          </a:lnRef>
+          <a:fillRef idx="1">
+            <a:schemeClr val="accent1"/>
+          </a:fillRef>
+          <a:effectRef idx="0">
+            <a:schemeClr val="accent1"/>
+          </a:effectRef>
+          <a:fontRef idx="minor">
+            <a:schemeClr val="lt1"/>
+          </a:fontRef>
+        </p:style>
+        <p:txBody>
+          <a:bodyPr rtlCol="0" anchor="ctr"/>
+          <a:lstStyle/>
+          <a:p>
+            <a:pPr algn="ctr"/>
+            <a:endParaRPr lang="en-US"/>
           </a:p>
         </p:txBody>
       </p:sp>
@@ -9372,15 +9777,46 @@
           <p:nvPr/>
         </p:nvPicPr>
         <p:blipFill>
-          <a:blip r:embed="rId2"/>
-          <a:stretch>
-            <a:fillRect/>
-          </a:stretch>
+          <a:blip r:embed="rId5"/>
+          <a:stretch/>
         </p:blipFill>
         <p:spPr>
           <a:xfrm>
-            <a:off x="5884832" y="2481755"/>
-            <a:ext cx="4923728" cy="3571466"/>
+            <a:off x="8568156" y="1679537"/>
+            <a:ext cx="2706302" cy="1589952"/>
+          </a:xfrm>
+          <a:prstGeom prst="rect">
+            <a:avLst/>
+          </a:prstGeom>
+          <a:ln>
+            <a:noFill/>
+          </a:ln>
+          <a:effectLst/>
+        </p:spPr>
+      </p:pic>
+      <p:pic>
+        <p:nvPicPr>
+          <p:cNvPr id="5" name="Imagen 4">
+            <a:extLst>
+              <a:ext uri="{FF2B5EF4-FFF2-40B4-BE49-F238E27FC236}">
+                <a16:creationId xmlns:a16="http://schemas.microsoft.com/office/drawing/2014/main" id="{3169C9AD-FFF6-42A5-81B1-522C30FF5556}"/>
+              </a:ext>
+            </a:extLst>
+          </p:cNvPr>
+          <p:cNvPicPr>
+            <a:picLocks noChangeAspect="1"/>
+          </p:cNvPicPr>
+          <p:nvPr/>
+        </p:nvPicPr>
+        <p:blipFill>
+          <a:blip r:embed="rId6"/>
+          <a:srcRect/>
+          <a:stretch/>
+        </p:blipFill>
+        <p:spPr>
+          <a:xfrm>
+            <a:off x="9080865" y="3591224"/>
+            <a:ext cx="1678945" cy="1588813"/>
           </a:xfrm>
           <a:prstGeom prst="rect">
             <a:avLst/>
@@ -9397,13 +9833,6 @@
   <p:clrMapOvr>
     <a:masterClrMapping/>
   </p:clrMapOvr>
-  <p:timing>
-    <p:tnLst>
-      <p:par>
-        <p:cTn id="1" dur="indefinite" restart="never" nodeType="tmRoot"/>
-      </p:par>
-    </p:tnLst>
-  </p:timing>
 </p:sld>
 </file>
 

</xml_diff>